<commit_message>
Changing Sql table Structure
</commit_message>
<xml_diff>
--- a/Design Requirement/Database/OverAllStructure.pptx
+++ b/Design Requirement/Database/OverAllStructure.pptx
@@ -6,11 +6,12 @@
     <p:sldMasterId id="2147483662" r:id="rId5"/>
   </p:sldMasterIdLst>
   <p:notesMasterIdLst>
-    <p:notesMasterId r:id="rId8"/>
+    <p:notesMasterId r:id="rId9"/>
   </p:notesMasterIdLst>
   <p:sldIdLst>
     <p:sldId id="271" r:id="rId6"/>
     <p:sldId id="272" r:id="rId7"/>
+    <p:sldId id="273" r:id="rId8"/>
   </p:sldIdLst>
   <p:sldSz cx="12192000" cy="6858000"/>
   <p:notesSz cx="6858000" cy="9144000"/>
@@ -199,7 +200,7 @@
           <a:p>
             <a:fld id="{DB6CA646-4DB0-4081-BAF1-518ED8EEB214}" type="datetimeFigureOut">
               <a:rPr lang="en-IN" smtClean="0"/>
-              <a:t>09-06-2024</a:t>
+              <a:t>26-07-2024</a:t>
             </a:fld>
             <a:endParaRPr lang="en-IN" dirty="0"/>
           </a:p>
@@ -647,6 +648,94 @@
 </p:notes>
 </file>
 
+<file path=ppt/notesSlides/notesSlide3.xml><?xml version="1.0" encoding="utf-8"?>
+<p:notes xmlns:a="http://schemas.openxmlformats.org/drawingml/2006/main" xmlns:r="http://schemas.openxmlformats.org/officeDocument/2006/relationships" xmlns:p="http://schemas.openxmlformats.org/presentationml/2006/main">
+  <p:cSld>
+    <p:spTree>
+      <p:nvGrpSpPr>
+        <p:cNvPr id="1" name=""/>
+        <p:cNvGrpSpPr/>
+        <p:nvPr/>
+      </p:nvGrpSpPr>
+      <p:grpSpPr>
+        <a:xfrm>
+          <a:off x="0" y="0"/>
+          <a:ext cx="0" cy="0"/>
+          <a:chOff x="0" y="0"/>
+          <a:chExt cx="0" cy="0"/>
+        </a:xfrm>
+      </p:grpSpPr>
+      <p:sp>
+        <p:nvSpPr>
+          <p:cNvPr id="2" name="Slide Image Placeholder 1"/>
+          <p:cNvSpPr>
+            <a:spLocks noGrp="1" noRot="1" noChangeAspect="1"/>
+          </p:cNvSpPr>
+          <p:nvPr>
+            <p:ph type="sldImg"/>
+          </p:nvPr>
+        </p:nvSpPr>
+        <p:spPr/>
+      </p:sp>
+      <p:sp>
+        <p:nvSpPr>
+          <p:cNvPr id="3" name="Notes Placeholder 2"/>
+          <p:cNvSpPr>
+            <a:spLocks noGrp="1"/>
+          </p:cNvSpPr>
+          <p:nvPr>
+            <p:ph type="body" idx="1"/>
+          </p:nvPr>
+        </p:nvSpPr>
+        <p:spPr/>
+        <p:txBody>
+          <a:bodyPr/>
+          <a:lstStyle/>
+          <a:p>
+            <a:r>
+              <a:rPr lang="en-US" dirty="0"/>
+              <a:t>Relationship Between Tables</a:t>
+            </a:r>
+            <a:endParaRPr lang="en-IN" dirty="0"/>
+          </a:p>
+        </p:txBody>
+      </p:sp>
+      <p:sp>
+        <p:nvSpPr>
+          <p:cNvPr id="4" name="Slide Number Placeholder 3"/>
+          <p:cNvSpPr>
+            <a:spLocks noGrp="1"/>
+          </p:cNvSpPr>
+          <p:nvPr>
+            <p:ph type="sldNum" sz="quarter" idx="5"/>
+          </p:nvPr>
+        </p:nvSpPr>
+        <p:spPr/>
+        <p:txBody>
+          <a:bodyPr/>
+          <a:lstStyle/>
+          <a:p>
+            <a:fld id="{65E2C0E8-241A-47C7-B504-B64E50FE720F}" type="slidenum">
+              <a:rPr lang="en-IN" smtClean="0"/>
+              <a:t>3</a:t>
+            </a:fld>
+            <a:endParaRPr lang="en-IN" dirty="0"/>
+          </a:p>
+        </p:txBody>
+      </p:sp>
+    </p:spTree>
+    <p:extLst>
+      <p:ext uri="{BB962C8B-B14F-4D97-AF65-F5344CB8AC3E}">
+        <p14:creationId xmlns:p14="http://schemas.microsoft.com/office/powerpoint/2010/main" val="4000198899"/>
+      </p:ext>
+    </p:extLst>
+  </p:cSld>
+  <p:clrMapOvr>
+    <a:masterClrMapping/>
+  </p:clrMapOvr>
+</p:notes>
+</file>
+
 <file path=ppt/slideLayouts/slideLayout1.xml><?xml version="1.0" encoding="utf-8"?>
 <p:sldLayout xmlns:a="http://schemas.openxmlformats.org/drawingml/2006/main" xmlns:r="http://schemas.openxmlformats.org/officeDocument/2006/relationships" xmlns:p="http://schemas.openxmlformats.org/presentationml/2006/main" type="title" preserve="1">
   <p:cSld name="Title Slide">
@@ -796,7 +885,7 @@
           <a:p>
             <a:fld id="{40BFCB34-1D3A-4E3D-AF01-87C69294AC55}" type="datetimeFigureOut">
               <a:rPr lang="en-IN" smtClean="0"/>
-              <a:t>09-06-2024</a:t>
+              <a:t>26-07-2024</a:t>
             </a:fld>
             <a:endParaRPr lang="en-IN" dirty="0"/>
           </a:p>
@@ -996,7 +1085,7 @@
           <a:p>
             <a:fld id="{40BFCB34-1D3A-4E3D-AF01-87C69294AC55}" type="datetimeFigureOut">
               <a:rPr lang="en-IN" smtClean="0"/>
-              <a:t>09-06-2024</a:t>
+              <a:t>26-07-2024</a:t>
             </a:fld>
             <a:endParaRPr lang="en-IN" dirty="0"/>
           </a:p>
@@ -1206,7 +1295,7 @@
           <a:p>
             <a:fld id="{40BFCB34-1D3A-4E3D-AF01-87C69294AC55}" type="datetimeFigureOut">
               <a:rPr lang="en-IN" smtClean="0"/>
-              <a:t>09-06-2024</a:t>
+              <a:t>26-07-2024</a:t>
             </a:fld>
             <a:endParaRPr lang="en-IN" dirty="0"/>
           </a:p>
@@ -1319,7 +1408,7 @@
           <a:p>
             <a:fld id="{53685DBC-317F-4C6B-AEE2-0BEBDE6560A6}" type="datetimeFigureOut">
               <a:rPr lang="en-US" smtClean="0"/>
-              <a:t>6/9/2024</a:t>
+              <a:t>7/26/2024</a:t>
             </a:fld>
             <a:endParaRPr lang="en-US" dirty="0"/>
           </a:p>
@@ -1519,7 +1608,7 @@
           <a:p>
             <a:fld id="{40BFCB34-1D3A-4E3D-AF01-87C69294AC55}" type="datetimeFigureOut">
               <a:rPr lang="en-IN" smtClean="0"/>
-              <a:t>09-06-2024</a:t>
+              <a:t>26-07-2024</a:t>
             </a:fld>
             <a:endParaRPr lang="en-IN" dirty="0"/>
           </a:p>
@@ -1795,7 +1884,7 @@
           <a:p>
             <a:fld id="{40BFCB34-1D3A-4E3D-AF01-87C69294AC55}" type="datetimeFigureOut">
               <a:rPr lang="en-IN" smtClean="0"/>
-              <a:t>09-06-2024</a:t>
+              <a:t>26-07-2024</a:t>
             </a:fld>
             <a:endParaRPr lang="en-IN" dirty="0"/>
           </a:p>
@@ -2063,7 +2152,7 @@
           <a:p>
             <a:fld id="{40BFCB34-1D3A-4E3D-AF01-87C69294AC55}" type="datetimeFigureOut">
               <a:rPr lang="en-IN" smtClean="0"/>
-              <a:t>09-06-2024</a:t>
+              <a:t>26-07-2024</a:t>
             </a:fld>
             <a:endParaRPr lang="en-IN" dirty="0"/>
           </a:p>
@@ -2478,7 +2567,7 @@
           <a:p>
             <a:fld id="{40BFCB34-1D3A-4E3D-AF01-87C69294AC55}" type="datetimeFigureOut">
               <a:rPr lang="en-IN" smtClean="0"/>
-              <a:t>09-06-2024</a:t>
+              <a:t>26-07-2024</a:t>
             </a:fld>
             <a:endParaRPr lang="en-IN" dirty="0"/>
           </a:p>
@@ -2620,7 +2709,7 @@
           <a:p>
             <a:fld id="{40BFCB34-1D3A-4E3D-AF01-87C69294AC55}" type="datetimeFigureOut">
               <a:rPr lang="en-IN" smtClean="0"/>
-              <a:t>09-06-2024</a:t>
+              <a:t>26-07-2024</a:t>
             </a:fld>
             <a:endParaRPr lang="en-IN" dirty="0"/>
           </a:p>
@@ -2733,7 +2822,7 @@
           <a:p>
             <a:fld id="{40BFCB34-1D3A-4E3D-AF01-87C69294AC55}" type="datetimeFigureOut">
               <a:rPr lang="en-IN" smtClean="0"/>
-              <a:t>09-06-2024</a:t>
+              <a:t>26-07-2024</a:t>
             </a:fld>
             <a:endParaRPr lang="en-IN" dirty="0"/>
           </a:p>
@@ -3046,7 +3135,7 @@
           <a:p>
             <a:fld id="{40BFCB34-1D3A-4E3D-AF01-87C69294AC55}" type="datetimeFigureOut">
               <a:rPr lang="en-IN" smtClean="0"/>
-              <a:t>09-06-2024</a:t>
+              <a:t>26-07-2024</a:t>
             </a:fld>
             <a:endParaRPr lang="en-IN" dirty="0"/>
           </a:p>
@@ -3335,7 +3424,7 @@
           <a:p>
             <a:fld id="{40BFCB34-1D3A-4E3D-AF01-87C69294AC55}" type="datetimeFigureOut">
               <a:rPr lang="en-IN" smtClean="0"/>
-              <a:t>09-06-2024</a:t>
+              <a:t>26-07-2024</a:t>
             </a:fld>
             <a:endParaRPr lang="en-IN" dirty="0"/>
           </a:p>
@@ -3578,7 +3667,7 @@
           <a:p>
             <a:fld id="{40BFCB34-1D3A-4E3D-AF01-87C69294AC55}" type="datetimeFigureOut">
               <a:rPr lang="en-IN" smtClean="0"/>
-              <a:t>09-06-2024</a:t>
+              <a:t>26-07-2024</a:t>
             </a:fld>
             <a:endParaRPr lang="en-IN" dirty="0"/>
           </a:p>
@@ -4149,7 +4238,7 @@
           <a:p>
             <a:fld id="{53685DBC-317F-4C6B-AEE2-0BEBDE6560A6}" type="datetimeFigureOut">
               <a:rPr lang="en-US" smtClean="0"/>
-              <a:t>6/9/2024</a:t>
+              <a:t>7/26/2024</a:t>
             </a:fld>
             <a:endParaRPr lang="en-US" dirty="0"/>
           </a:p>
@@ -10699,6 +10788,2182 @@
     <p:extLst>
       <p:ext uri="{BB962C8B-B14F-4D97-AF65-F5344CB8AC3E}">
         <p14:creationId xmlns:p14="http://schemas.microsoft.com/office/powerpoint/2010/main" val="2677370425"/>
+      </p:ext>
+    </p:extLst>
+  </p:cSld>
+  <p:clrMapOvr>
+    <a:masterClrMapping/>
+  </p:clrMapOvr>
+</p:sld>
+</file>
+
+<file path=ppt/slides/slide3.xml><?xml version="1.0" encoding="utf-8"?>
+<p:sld xmlns:a="http://schemas.openxmlformats.org/drawingml/2006/main" xmlns:r="http://schemas.openxmlformats.org/officeDocument/2006/relationships" xmlns:p="http://schemas.openxmlformats.org/presentationml/2006/main">
+  <p:cSld>
+    <p:bg>
+      <p:bgPr>
+        <a:solidFill>
+          <a:srgbClr val="F7F7F7"/>
+        </a:solidFill>
+        <a:effectLst/>
+      </p:bgPr>
+    </p:bg>
+    <p:spTree>
+      <p:nvGrpSpPr>
+        <p:cNvPr id="1" name=""/>
+        <p:cNvGrpSpPr/>
+        <p:nvPr/>
+      </p:nvGrpSpPr>
+      <p:grpSpPr>
+        <a:xfrm>
+          <a:off x="0" y="0"/>
+          <a:ext cx="0" cy="0"/>
+          <a:chOff x="0" y="0"/>
+          <a:chExt cx="0" cy="0"/>
+        </a:xfrm>
+      </p:grpSpPr>
+      <p:grpSp>
+        <p:nvGrpSpPr>
+          <p:cNvPr id="9" name="Group 8">
+            <a:extLst>
+              <a:ext uri="{FF2B5EF4-FFF2-40B4-BE49-F238E27FC236}">
+                <a16:creationId xmlns:a16="http://schemas.microsoft.com/office/drawing/2014/main" id="{1EF5EB69-4E65-DF58-5785-5A9DFDF0E527}"/>
+              </a:ext>
+            </a:extLst>
+          </p:cNvPr>
+          <p:cNvGrpSpPr/>
+          <p:nvPr/>
+        </p:nvGrpSpPr>
+        <p:grpSpPr>
+          <a:xfrm>
+            <a:off x="9594590" y="5855023"/>
+            <a:ext cx="1676857" cy="864485"/>
+            <a:chOff x="577970" y="431321"/>
+            <a:chExt cx="2329132" cy="864485"/>
+          </a:xfrm>
+        </p:grpSpPr>
+        <p:sp>
+          <p:nvSpPr>
+            <p:cNvPr id="10" name="Rectangle 9">
+              <a:extLst>
+                <a:ext uri="{FF2B5EF4-FFF2-40B4-BE49-F238E27FC236}">
+                  <a16:creationId xmlns:a16="http://schemas.microsoft.com/office/drawing/2014/main" id="{E1815D5C-965E-5B08-0763-2A8A3303FFFF}"/>
+                </a:ext>
+              </a:extLst>
+            </p:cNvPr>
+            <p:cNvSpPr/>
+            <p:nvPr/>
+          </p:nvSpPr>
+          <p:spPr>
+            <a:xfrm>
+              <a:off x="577970" y="431321"/>
+              <a:ext cx="2329132" cy="864485"/>
+            </a:xfrm>
+            <a:prstGeom prst="rect">
+              <a:avLst/>
+            </a:prstGeom>
+            <a:noFill/>
+            <a:ln>
+              <a:solidFill>
+                <a:srgbClr val="52C9BD"/>
+              </a:solidFill>
+            </a:ln>
+          </p:spPr>
+          <p:style>
+            <a:lnRef idx="2">
+              <a:schemeClr val="accent1">
+                <a:shade val="15000"/>
+              </a:schemeClr>
+            </a:lnRef>
+            <a:fillRef idx="1">
+              <a:schemeClr val="accent1"/>
+            </a:fillRef>
+            <a:effectRef idx="0">
+              <a:schemeClr val="accent1"/>
+            </a:effectRef>
+            <a:fontRef idx="minor">
+              <a:schemeClr val="lt1"/>
+            </a:fontRef>
+          </p:style>
+          <p:txBody>
+            <a:bodyPr rtlCol="0" anchor="ctr"/>
+            <a:lstStyle/>
+            <a:p>
+              <a:pPr algn="ctr"/>
+              <a:endParaRPr lang="en-IN"/>
+            </a:p>
+          </p:txBody>
+        </p:sp>
+        <p:sp>
+          <p:nvSpPr>
+            <p:cNvPr id="11" name="Rectangle 10">
+              <a:extLst>
+                <a:ext uri="{FF2B5EF4-FFF2-40B4-BE49-F238E27FC236}">
+                  <a16:creationId xmlns:a16="http://schemas.microsoft.com/office/drawing/2014/main" id="{BCFB930D-173C-03E0-050C-AE828D6F5185}"/>
+                </a:ext>
+              </a:extLst>
+            </p:cNvPr>
+            <p:cNvSpPr/>
+            <p:nvPr/>
+          </p:nvSpPr>
+          <p:spPr>
+            <a:xfrm>
+              <a:off x="577970" y="431321"/>
+              <a:ext cx="2329132" cy="276999"/>
+            </a:xfrm>
+            <a:prstGeom prst="rect">
+              <a:avLst/>
+            </a:prstGeom>
+            <a:noFill/>
+            <a:ln>
+              <a:solidFill>
+                <a:srgbClr val="52C9BD"/>
+              </a:solidFill>
+            </a:ln>
+          </p:spPr>
+          <p:style>
+            <a:lnRef idx="2">
+              <a:schemeClr val="accent1">
+                <a:shade val="15000"/>
+              </a:schemeClr>
+            </a:lnRef>
+            <a:fillRef idx="1">
+              <a:schemeClr val="accent1"/>
+            </a:fillRef>
+            <a:effectRef idx="0">
+              <a:schemeClr val="accent1"/>
+            </a:effectRef>
+            <a:fontRef idx="minor">
+              <a:schemeClr val="lt1"/>
+            </a:fontRef>
+          </p:style>
+          <p:txBody>
+            <a:bodyPr rtlCol="0" anchor="ctr"/>
+            <a:lstStyle/>
+            <a:p>
+              <a:pPr algn="ctr"/>
+              <a:r>
+                <a:rPr lang="en-US" sz="1200" dirty="0" err="1">
+                  <a:solidFill>
+                    <a:srgbClr val="5D7373"/>
+                  </a:solidFill>
+                  <a:latin typeface="Avenir Next LT Pro" panose="020B0504020202020204" pitchFamily="34" charset="0"/>
+                </a:rPr>
+                <a:t>CallUp</a:t>
+              </a:r>
+              <a:endParaRPr lang="en-IN" sz="1200" dirty="0">
+                <a:solidFill>
+                  <a:srgbClr val="5D7373"/>
+                </a:solidFill>
+                <a:latin typeface="Avenir Next LT Pro" panose="020B0504020202020204" pitchFamily="34" charset="0"/>
+              </a:endParaRPr>
+            </a:p>
+          </p:txBody>
+        </p:sp>
+        <p:sp>
+          <p:nvSpPr>
+            <p:cNvPr id="12" name="TextBox 11">
+              <a:extLst>
+                <a:ext uri="{FF2B5EF4-FFF2-40B4-BE49-F238E27FC236}">
+                  <a16:creationId xmlns:a16="http://schemas.microsoft.com/office/drawing/2014/main" id="{075B12C8-6304-DF4A-4C53-9B5ED68BE434}"/>
+                </a:ext>
+              </a:extLst>
+            </p:cNvPr>
+            <p:cNvSpPr txBox="1"/>
+            <p:nvPr/>
+          </p:nvSpPr>
+          <p:spPr>
+            <a:xfrm>
+              <a:off x="577970" y="791785"/>
+              <a:ext cx="2329131" cy="430887"/>
+            </a:xfrm>
+            <a:prstGeom prst="rect">
+              <a:avLst/>
+            </a:prstGeom>
+            <a:noFill/>
+          </p:spPr>
+          <p:txBody>
+            <a:bodyPr wrap="square" rtlCol="0">
+              <a:spAutoFit/>
+            </a:bodyPr>
+            <a:lstStyle/>
+            <a:p>
+              <a:r>
+                <a:rPr lang="en-US" sz="1100" dirty="0" err="1">
+                  <a:latin typeface="Avenir Next LT Pro" panose="020B0504020202020204" pitchFamily="34" charset="0"/>
+                </a:rPr>
+                <a:t>callId</a:t>
+              </a:r>
+              <a:endParaRPr lang="en-US" sz="1100" dirty="0">
+                <a:latin typeface="Avenir Next LT Pro" panose="020B0504020202020204" pitchFamily="34" charset="0"/>
+              </a:endParaRPr>
+            </a:p>
+            <a:p>
+              <a:r>
+                <a:rPr lang="en-US" sz="1100" dirty="0" err="1">
+                  <a:latin typeface="Avenir Next LT Pro" panose="020B0504020202020204" pitchFamily="34" charset="0"/>
+                </a:rPr>
+                <a:t>contentId</a:t>
+              </a:r>
+              <a:endParaRPr lang="en-US" sz="1100" dirty="0">
+                <a:latin typeface="Avenir Next LT Pro" panose="020B0504020202020204" pitchFamily="34" charset="0"/>
+              </a:endParaRPr>
+            </a:p>
+          </p:txBody>
+        </p:sp>
+      </p:grpSp>
+      <p:grpSp>
+        <p:nvGrpSpPr>
+          <p:cNvPr id="13" name="Group 12">
+            <a:extLst>
+              <a:ext uri="{FF2B5EF4-FFF2-40B4-BE49-F238E27FC236}">
+                <a16:creationId xmlns:a16="http://schemas.microsoft.com/office/drawing/2014/main" id="{E77F5005-8E9D-632C-63E0-1F65AAD962CB}"/>
+              </a:ext>
+            </a:extLst>
+          </p:cNvPr>
+          <p:cNvGrpSpPr/>
+          <p:nvPr/>
+        </p:nvGrpSpPr>
+        <p:grpSpPr>
+          <a:xfrm>
+            <a:off x="9594590" y="1940271"/>
+            <a:ext cx="1676857" cy="960628"/>
+            <a:chOff x="577970" y="431321"/>
+            <a:chExt cx="2329132" cy="960628"/>
+          </a:xfrm>
+        </p:grpSpPr>
+        <p:sp>
+          <p:nvSpPr>
+            <p:cNvPr id="14" name="Rectangle 13">
+              <a:extLst>
+                <a:ext uri="{FF2B5EF4-FFF2-40B4-BE49-F238E27FC236}">
+                  <a16:creationId xmlns:a16="http://schemas.microsoft.com/office/drawing/2014/main" id="{973473AF-55C2-8E8A-EFAF-6F4F61BD19AC}"/>
+                </a:ext>
+              </a:extLst>
+            </p:cNvPr>
+            <p:cNvSpPr/>
+            <p:nvPr/>
+          </p:nvSpPr>
+          <p:spPr>
+            <a:xfrm>
+              <a:off x="577970" y="431321"/>
+              <a:ext cx="2329132" cy="864485"/>
+            </a:xfrm>
+            <a:prstGeom prst="rect">
+              <a:avLst/>
+            </a:prstGeom>
+            <a:noFill/>
+            <a:ln>
+              <a:solidFill>
+                <a:srgbClr val="52C9BD"/>
+              </a:solidFill>
+            </a:ln>
+          </p:spPr>
+          <p:style>
+            <a:lnRef idx="2">
+              <a:schemeClr val="accent1">
+                <a:shade val="15000"/>
+              </a:schemeClr>
+            </a:lnRef>
+            <a:fillRef idx="1">
+              <a:schemeClr val="accent1"/>
+            </a:fillRef>
+            <a:effectRef idx="0">
+              <a:schemeClr val="accent1"/>
+            </a:effectRef>
+            <a:fontRef idx="minor">
+              <a:schemeClr val="lt1"/>
+            </a:fontRef>
+          </p:style>
+          <p:txBody>
+            <a:bodyPr rtlCol="0" anchor="ctr"/>
+            <a:lstStyle/>
+            <a:p>
+              <a:pPr algn="ctr"/>
+              <a:endParaRPr lang="en-IN"/>
+            </a:p>
+          </p:txBody>
+        </p:sp>
+        <p:sp>
+          <p:nvSpPr>
+            <p:cNvPr id="15" name="Rectangle 14">
+              <a:extLst>
+                <a:ext uri="{FF2B5EF4-FFF2-40B4-BE49-F238E27FC236}">
+                  <a16:creationId xmlns:a16="http://schemas.microsoft.com/office/drawing/2014/main" id="{C9BF9114-DFA4-A150-8C0E-A4C62867BCF4}"/>
+                </a:ext>
+              </a:extLst>
+            </p:cNvPr>
+            <p:cNvSpPr/>
+            <p:nvPr/>
+          </p:nvSpPr>
+          <p:spPr>
+            <a:xfrm>
+              <a:off x="577970" y="431321"/>
+              <a:ext cx="2329132" cy="276999"/>
+            </a:xfrm>
+            <a:prstGeom prst="rect">
+              <a:avLst/>
+            </a:prstGeom>
+            <a:noFill/>
+            <a:ln>
+              <a:solidFill>
+                <a:srgbClr val="52C9BD"/>
+              </a:solidFill>
+            </a:ln>
+          </p:spPr>
+          <p:style>
+            <a:lnRef idx="2">
+              <a:schemeClr val="accent1">
+                <a:shade val="15000"/>
+              </a:schemeClr>
+            </a:lnRef>
+            <a:fillRef idx="1">
+              <a:schemeClr val="accent1"/>
+            </a:fillRef>
+            <a:effectRef idx="0">
+              <a:schemeClr val="accent1"/>
+            </a:effectRef>
+            <a:fontRef idx="minor">
+              <a:schemeClr val="lt1"/>
+            </a:fontRef>
+          </p:style>
+          <p:txBody>
+            <a:bodyPr rtlCol="0" anchor="ctr"/>
+            <a:lstStyle/>
+            <a:p>
+              <a:pPr algn="ctr"/>
+              <a:r>
+                <a:rPr lang="en-US" sz="1200" dirty="0">
+                  <a:solidFill>
+                    <a:srgbClr val="5D7373"/>
+                  </a:solidFill>
+                  <a:latin typeface="Avenir Next LT Pro" panose="020B0504020202020204" pitchFamily="34" charset="0"/>
+                </a:rPr>
+                <a:t>File</a:t>
+              </a:r>
+              <a:endParaRPr lang="en-IN" sz="1200" dirty="0">
+                <a:solidFill>
+                  <a:srgbClr val="5D7373"/>
+                </a:solidFill>
+                <a:latin typeface="Avenir Next LT Pro" panose="020B0504020202020204" pitchFamily="34" charset="0"/>
+              </a:endParaRPr>
+            </a:p>
+          </p:txBody>
+        </p:sp>
+        <p:sp>
+          <p:nvSpPr>
+            <p:cNvPr id="16" name="TextBox 15">
+              <a:extLst>
+                <a:ext uri="{FF2B5EF4-FFF2-40B4-BE49-F238E27FC236}">
+                  <a16:creationId xmlns:a16="http://schemas.microsoft.com/office/drawing/2014/main" id="{C62C12D1-F029-4D25-A148-34FD249DCA22}"/>
+                </a:ext>
+              </a:extLst>
+            </p:cNvPr>
+            <p:cNvSpPr txBox="1"/>
+            <p:nvPr/>
+          </p:nvSpPr>
+          <p:spPr>
+            <a:xfrm>
+              <a:off x="577970" y="791785"/>
+              <a:ext cx="2329131" cy="600164"/>
+            </a:xfrm>
+            <a:prstGeom prst="rect">
+              <a:avLst/>
+            </a:prstGeom>
+            <a:noFill/>
+          </p:spPr>
+          <p:txBody>
+            <a:bodyPr wrap="square" rtlCol="0">
+              <a:spAutoFit/>
+            </a:bodyPr>
+            <a:lstStyle/>
+            <a:p>
+              <a:r>
+                <a:rPr lang="en-US" sz="1100" dirty="0" err="1">
+                  <a:latin typeface="Avenir Next LT Pro" panose="020B0504020202020204" pitchFamily="34" charset="0"/>
+                </a:rPr>
+                <a:t>fileId</a:t>
+              </a:r>
+              <a:endParaRPr lang="en-US" sz="1100" dirty="0">
+                <a:latin typeface="Avenir Next LT Pro" panose="020B0504020202020204" pitchFamily="34" charset="0"/>
+              </a:endParaRPr>
+            </a:p>
+            <a:p>
+              <a:r>
+                <a:rPr lang="en-US" sz="1100" dirty="0" err="1">
+                  <a:latin typeface="Avenir Next LT Pro" panose="020B0504020202020204" pitchFamily="34" charset="0"/>
+                </a:rPr>
+                <a:t>contentId</a:t>
+              </a:r>
+              <a:endParaRPr lang="en-US" sz="1100" dirty="0">
+                <a:latin typeface="Avenir Next LT Pro" panose="020B0504020202020204" pitchFamily="34" charset="0"/>
+              </a:endParaRPr>
+            </a:p>
+            <a:p>
+              <a:endParaRPr lang="en-IN" sz="1100" dirty="0">
+                <a:latin typeface="Avenir Next LT Pro" panose="020B0504020202020204" pitchFamily="34" charset="0"/>
+              </a:endParaRPr>
+            </a:p>
+          </p:txBody>
+        </p:sp>
+      </p:grpSp>
+      <p:grpSp>
+        <p:nvGrpSpPr>
+          <p:cNvPr id="17" name="Group 16">
+            <a:extLst>
+              <a:ext uri="{FF2B5EF4-FFF2-40B4-BE49-F238E27FC236}">
+                <a16:creationId xmlns:a16="http://schemas.microsoft.com/office/drawing/2014/main" id="{5C79D94A-D26E-76C3-8ADA-D03B3B5907AF}"/>
+              </a:ext>
+            </a:extLst>
+          </p:cNvPr>
+          <p:cNvGrpSpPr/>
+          <p:nvPr/>
+        </p:nvGrpSpPr>
+        <p:grpSpPr>
+          <a:xfrm>
+            <a:off x="5645760" y="2855943"/>
+            <a:ext cx="1676857" cy="960628"/>
+            <a:chOff x="577970" y="431321"/>
+            <a:chExt cx="2329132" cy="960628"/>
+          </a:xfrm>
+        </p:grpSpPr>
+        <p:sp>
+          <p:nvSpPr>
+            <p:cNvPr id="18" name="Rectangle 17">
+              <a:extLst>
+                <a:ext uri="{FF2B5EF4-FFF2-40B4-BE49-F238E27FC236}">
+                  <a16:creationId xmlns:a16="http://schemas.microsoft.com/office/drawing/2014/main" id="{A0FFFB4E-E4BD-855C-0AB4-0149FF5E06E1}"/>
+                </a:ext>
+              </a:extLst>
+            </p:cNvPr>
+            <p:cNvSpPr/>
+            <p:nvPr/>
+          </p:nvSpPr>
+          <p:spPr>
+            <a:xfrm>
+              <a:off x="577970" y="431321"/>
+              <a:ext cx="2329132" cy="864485"/>
+            </a:xfrm>
+            <a:prstGeom prst="rect">
+              <a:avLst/>
+            </a:prstGeom>
+            <a:noFill/>
+            <a:ln>
+              <a:solidFill>
+                <a:srgbClr val="52C9BD"/>
+              </a:solidFill>
+            </a:ln>
+          </p:spPr>
+          <p:style>
+            <a:lnRef idx="2">
+              <a:schemeClr val="accent1">
+                <a:shade val="15000"/>
+              </a:schemeClr>
+            </a:lnRef>
+            <a:fillRef idx="1">
+              <a:schemeClr val="accent1"/>
+            </a:fillRef>
+            <a:effectRef idx="0">
+              <a:schemeClr val="accent1"/>
+            </a:effectRef>
+            <a:fontRef idx="minor">
+              <a:schemeClr val="lt1"/>
+            </a:fontRef>
+          </p:style>
+          <p:txBody>
+            <a:bodyPr rtlCol="0" anchor="ctr"/>
+            <a:lstStyle/>
+            <a:p>
+              <a:pPr algn="ctr"/>
+              <a:endParaRPr lang="en-IN"/>
+            </a:p>
+          </p:txBody>
+        </p:sp>
+        <p:sp>
+          <p:nvSpPr>
+            <p:cNvPr id="19" name="Rectangle 18">
+              <a:extLst>
+                <a:ext uri="{FF2B5EF4-FFF2-40B4-BE49-F238E27FC236}">
+                  <a16:creationId xmlns:a16="http://schemas.microsoft.com/office/drawing/2014/main" id="{2AF86259-EB0A-93F2-C7CC-D949A5D3C7E0}"/>
+                </a:ext>
+              </a:extLst>
+            </p:cNvPr>
+            <p:cNvSpPr/>
+            <p:nvPr/>
+          </p:nvSpPr>
+          <p:spPr>
+            <a:xfrm>
+              <a:off x="577970" y="431321"/>
+              <a:ext cx="2329132" cy="276999"/>
+            </a:xfrm>
+            <a:prstGeom prst="rect">
+              <a:avLst/>
+            </a:prstGeom>
+            <a:noFill/>
+            <a:ln>
+              <a:solidFill>
+                <a:srgbClr val="52C9BD"/>
+              </a:solidFill>
+            </a:ln>
+          </p:spPr>
+          <p:style>
+            <a:lnRef idx="2">
+              <a:schemeClr val="accent1">
+                <a:shade val="15000"/>
+              </a:schemeClr>
+            </a:lnRef>
+            <a:fillRef idx="1">
+              <a:schemeClr val="accent1"/>
+            </a:fillRef>
+            <a:effectRef idx="0">
+              <a:schemeClr val="accent1"/>
+            </a:effectRef>
+            <a:fontRef idx="minor">
+              <a:schemeClr val="lt1"/>
+            </a:fontRef>
+          </p:style>
+          <p:txBody>
+            <a:bodyPr rtlCol="0" anchor="ctr"/>
+            <a:lstStyle/>
+            <a:p>
+              <a:pPr algn="ctr"/>
+              <a:r>
+                <a:rPr lang="en-US" sz="1200" dirty="0">
+                  <a:solidFill>
+                    <a:srgbClr val="5D7373"/>
+                  </a:solidFill>
+                  <a:latin typeface="Avenir Next LT Pro" panose="020B0504020202020204" pitchFamily="34" charset="0"/>
+                </a:rPr>
+                <a:t>Chat</a:t>
+              </a:r>
+              <a:endParaRPr lang="en-IN" sz="1200" dirty="0">
+                <a:solidFill>
+                  <a:srgbClr val="5D7373"/>
+                </a:solidFill>
+                <a:latin typeface="Avenir Next LT Pro" panose="020B0504020202020204" pitchFamily="34" charset="0"/>
+              </a:endParaRPr>
+            </a:p>
+          </p:txBody>
+        </p:sp>
+        <p:sp>
+          <p:nvSpPr>
+            <p:cNvPr id="20" name="TextBox 19">
+              <a:extLst>
+                <a:ext uri="{FF2B5EF4-FFF2-40B4-BE49-F238E27FC236}">
+                  <a16:creationId xmlns:a16="http://schemas.microsoft.com/office/drawing/2014/main" id="{04DBC3F0-FC20-09BD-568A-979E622BC901}"/>
+                </a:ext>
+              </a:extLst>
+            </p:cNvPr>
+            <p:cNvSpPr txBox="1"/>
+            <p:nvPr/>
+          </p:nvSpPr>
+          <p:spPr>
+            <a:xfrm>
+              <a:off x="577970" y="791785"/>
+              <a:ext cx="2329131" cy="600164"/>
+            </a:xfrm>
+            <a:prstGeom prst="rect">
+              <a:avLst/>
+            </a:prstGeom>
+            <a:noFill/>
+          </p:spPr>
+          <p:txBody>
+            <a:bodyPr wrap="square" rtlCol="0">
+              <a:spAutoFit/>
+            </a:bodyPr>
+            <a:lstStyle/>
+            <a:p>
+              <a:r>
+                <a:rPr lang="en-US" sz="1100" dirty="0" err="1">
+                  <a:latin typeface="Avenir Next LT Pro" panose="020B0504020202020204" pitchFamily="34" charset="0"/>
+                </a:rPr>
+                <a:t>chatId</a:t>
+              </a:r>
+              <a:endParaRPr lang="en-US" sz="1100" dirty="0">
+                <a:latin typeface="Avenir Next LT Pro" panose="020B0504020202020204" pitchFamily="34" charset="0"/>
+              </a:endParaRPr>
+            </a:p>
+            <a:p>
+              <a:r>
+                <a:rPr lang="en-US" sz="1100" dirty="0" err="1">
+                  <a:latin typeface="Avenir Next LT Pro" panose="020B0504020202020204" pitchFamily="34" charset="0"/>
+                </a:rPr>
+                <a:t>userId</a:t>
+              </a:r>
+              <a:endParaRPr lang="en-US" sz="1100" dirty="0">
+                <a:latin typeface="Avenir Next LT Pro" panose="020B0504020202020204" pitchFamily="34" charset="0"/>
+              </a:endParaRPr>
+            </a:p>
+            <a:p>
+              <a:endParaRPr lang="en-IN" sz="1100" dirty="0">
+                <a:latin typeface="Avenir Next LT Pro" panose="020B0504020202020204" pitchFamily="34" charset="0"/>
+              </a:endParaRPr>
+            </a:p>
+          </p:txBody>
+        </p:sp>
+      </p:grpSp>
+      <p:grpSp>
+        <p:nvGrpSpPr>
+          <p:cNvPr id="21" name="Group 20">
+            <a:extLst>
+              <a:ext uri="{FF2B5EF4-FFF2-40B4-BE49-F238E27FC236}">
+                <a16:creationId xmlns:a16="http://schemas.microsoft.com/office/drawing/2014/main" id="{E16C9A24-CF2E-982C-7482-8AA5D9F875E4}"/>
+              </a:ext>
+            </a:extLst>
+          </p:cNvPr>
+          <p:cNvGrpSpPr/>
+          <p:nvPr/>
+        </p:nvGrpSpPr>
+        <p:grpSpPr>
+          <a:xfrm>
+            <a:off x="9588140" y="27030"/>
+            <a:ext cx="1676857" cy="864485"/>
+            <a:chOff x="577970" y="431321"/>
+            <a:chExt cx="2329132" cy="864485"/>
+          </a:xfrm>
+        </p:grpSpPr>
+        <p:sp>
+          <p:nvSpPr>
+            <p:cNvPr id="22" name="Rectangle 21">
+              <a:extLst>
+                <a:ext uri="{FF2B5EF4-FFF2-40B4-BE49-F238E27FC236}">
+                  <a16:creationId xmlns:a16="http://schemas.microsoft.com/office/drawing/2014/main" id="{E6DD94CC-CC07-B4C3-8C79-793B03002BC9}"/>
+                </a:ext>
+              </a:extLst>
+            </p:cNvPr>
+            <p:cNvSpPr/>
+            <p:nvPr/>
+          </p:nvSpPr>
+          <p:spPr>
+            <a:xfrm>
+              <a:off x="577970" y="431321"/>
+              <a:ext cx="2329132" cy="864485"/>
+            </a:xfrm>
+            <a:prstGeom prst="rect">
+              <a:avLst/>
+            </a:prstGeom>
+            <a:noFill/>
+            <a:ln>
+              <a:solidFill>
+                <a:srgbClr val="52C9BD"/>
+              </a:solidFill>
+            </a:ln>
+          </p:spPr>
+          <p:style>
+            <a:lnRef idx="2">
+              <a:schemeClr val="accent1">
+                <a:shade val="15000"/>
+              </a:schemeClr>
+            </a:lnRef>
+            <a:fillRef idx="1">
+              <a:schemeClr val="accent1"/>
+            </a:fillRef>
+            <a:effectRef idx="0">
+              <a:schemeClr val="accent1"/>
+            </a:effectRef>
+            <a:fontRef idx="minor">
+              <a:schemeClr val="lt1"/>
+            </a:fontRef>
+          </p:style>
+          <p:txBody>
+            <a:bodyPr rtlCol="0" anchor="ctr"/>
+            <a:lstStyle/>
+            <a:p>
+              <a:pPr algn="ctr"/>
+              <a:endParaRPr lang="en-IN"/>
+            </a:p>
+          </p:txBody>
+        </p:sp>
+        <p:sp>
+          <p:nvSpPr>
+            <p:cNvPr id="23" name="Rectangle 22">
+              <a:extLst>
+                <a:ext uri="{FF2B5EF4-FFF2-40B4-BE49-F238E27FC236}">
+                  <a16:creationId xmlns:a16="http://schemas.microsoft.com/office/drawing/2014/main" id="{EA89E6B3-A3C6-E5FC-90D1-F7DFD8393154}"/>
+                </a:ext>
+              </a:extLst>
+            </p:cNvPr>
+            <p:cNvSpPr/>
+            <p:nvPr/>
+          </p:nvSpPr>
+          <p:spPr>
+            <a:xfrm>
+              <a:off x="577970" y="431321"/>
+              <a:ext cx="2329132" cy="276999"/>
+            </a:xfrm>
+            <a:prstGeom prst="rect">
+              <a:avLst/>
+            </a:prstGeom>
+            <a:noFill/>
+            <a:ln>
+              <a:solidFill>
+                <a:srgbClr val="52C9BD"/>
+              </a:solidFill>
+            </a:ln>
+          </p:spPr>
+          <p:style>
+            <a:lnRef idx="2">
+              <a:schemeClr val="accent1">
+                <a:shade val="15000"/>
+              </a:schemeClr>
+            </a:lnRef>
+            <a:fillRef idx="1">
+              <a:schemeClr val="accent1"/>
+            </a:fillRef>
+            <a:effectRef idx="0">
+              <a:schemeClr val="accent1"/>
+            </a:effectRef>
+            <a:fontRef idx="minor">
+              <a:schemeClr val="lt1"/>
+            </a:fontRef>
+          </p:style>
+          <p:txBody>
+            <a:bodyPr rtlCol="0" anchor="ctr"/>
+            <a:lstStyle/>
+            <a:p>
+              <a:pPr algn="ctr"/>
+              <a:r>
+                <a:rPr lang="en-US" sz="1200" dirty="0">
+                  <a:solidFill>
+                    <a:srgbClr val="5D7373"/>
+                  </a:solidFill>
+                  <a:latin typeface="Avenir Next LT Pro" panose="020B0504020202020204" pitchFamily="34" charset="0"/>
+                </a:rPr>
+                <a:t>Location</a:t>
+              </a:r>
+              <a:endParaRPr lang="en-IN" sz="1200" dirty="0">
+                <a:solidFill>
+                  <a:srgbClr val="5D7373"/>
+                </a:solidFill>
+                <a:latin typeface="Avenir Next LT Pro" panose="020B0504020202020204" pitchFamily="34" charset="0"/>
+              </a:endParaRPr>
+            </a:p>
+          </p:txBody>
+        </p:sp>
+        <p:sp>
+          <p:nvSpPr>
+            <p:cNvPr id="24" name="TextBox 23">
+              <a:extLst>
+                <a:ext uri="{FF2B5EF4-FFF2-40B4-BE49-F238E27FC236}">
+                  <a16:creationId xmlns:a16="http://schemas.microsoft.com/office/drawing/2014/main" id="{8AD29227-C2C3-91F3-1FEC-0EE843274F79}"/>
+                </a:ext>
+              </a:extLst>
+            </p:cNvPr>
+            <p:cNvSpPr txBox="1"/>
+            <p:nvPr/>
+          </p:nvSpPr>
+          <p:spPr>
+            <a:xfrm>
+              <a:off x="577970" y="791785"/>
+              <a:ext cx="2329131" cy="430887"/>
+            </a:xfrm>
+            <a:prstGeom prst="rect">
+              <a:avLst/>
+            </a:prstGeom>
+            <a:noFill/>
+          </p:spPr>
+          <p:txBody>
+            <a:bodyPr wrap="square" rtlCol="0">
+              <a:spAutoFit/>
+            </a:bodyPr>
+            <a:lstStyle/>
+            <a:p>
+              <a:r>
+                <a:rPr lang="en-US" sz="1100" dirty="0" err="1">
+                  <a:latin typeface="Avenir Next LT Pro" panose="020B0504020202020204" pitchFamily="34" charset="0"/>
+                </a:rPr>
+                <a:t>addressId</a:t>
+              </a:r>
+              <a:endParaRPr lang="en-US" sz="1100" dirty="0">
+                <a:latin typeface="Avenir Next LT Pro" panose="020B0504020202020204" pitchFamily="34" charset="0"/>
+              </a:endParaRPr>
+            </a:p>
+            <a:p>
+              <a:r>
+                <a:rPr lang="en-US" sz="1100" dirty="0" err="1">
+                  <a:latin typeface="Avenir Next LT Pro" panose="020B0504020202020204" pitchFamily="34" charset="0"/>
+                </a:rPr>
+                <a:t>contentId</a:t>
+              </a:r>
+              <a:endParaRPr lang="en-IN" sz="1100" dirty="0">
+                <a:latin typeface="Avenir Next LT Pro" panose="020B0504020202020204" pitchFamily="34" charset="0"/>
+              </a:endParaRPr>
+            </a:p>
+          </p:txBody>
+        </p:sp>
+      </p:grpSp>
+      <p:grpSp>
+        <p:nvGrpSpPr>
+          <p:cNvPr id="25" name="Group 24">
+            <a:extLst>
+              <a:ext uri="{FF2B5EF4-FFF2-40B4-BE49-F238E27FC236}">
+                <a16:creationId xmlns:a16="http://schemas.microsoft.com/office/drawing/2014/main" id="{B5D756E1-F6B9-90CE-B873-9A6ADD45FFC9}"/>
+              </a:ext>
+            </a:extLst>
+          </p:cNvPr>
+          <p:cNvGrpSpPr/>
+          <p:nvPr/>
+        </p:nvGrpSpPr>
+        <p:grpSpPr>
+          <a:xfrm>
+            <a:off x="9594590" y="983512"/>
+            <a:ext cx="1676857" cy="864485"/>
+            <a:chOff x="577970" y="431321"/>
+            <a:chExt cx="2329132" cy="864485"/>
+          </a:xfrm>
+        </p:grpSpPr>
+        <p:sp>
+          <p:nvSpPr>
+            <p:cNvPr id="26" name="Rectangle 25">
+              <a:extLst>
+                <a:ext uri="{FF2B5EF4-FFF2-40B4-BE49-F238E27FC236}">
+                  <a16:creationId xmlns:a16="http://schemas.microsoft.com/office/drawing/2014/main" id="{2E590781-D556-40CD-93FD-9191BDBCDD7B}"/>
+                </a:ext>
+              </a:extLst>
+            </p:cNvPr>
+            <p:cNvSpPr/>
+            <p:nvPr/>
+          </p:nvSpPr>
+          <p:spPr>
+            <a:xfrm>
+              <a:off x="577970" y="431321"/>
+              <a:ext cx="2329132" cy="864485"/>
+            </a:xfrm>
+            <a:prstGeom prst="rect">
+              <a:avLst/>
+            </a:prstGeom>
+            <a:noFill/>
+            <a:ln>
+              <a:solidFill>
+                <a:srgbClr val="52C9BD"/>
+              </a:solidFill>
+            </a:ln>
+          </p:spPr>
+          <p:style>
+            <a:lnRef idx="2">
+              <a:schemeClr val="accent1">
+                <a:shade val="15000"/>
+              </a:schemeClr>
+            </a:lnRef>
+            <a:fillRef idx="1">
+              <a:schemeClr val="accent1"/>
+            </a:fillRef>
+            <a:effectRef idx="0">
+              <a:schemeClr val="accent1"/>
+            </a:effectRef>
+            <a:fontRef idx="minor">
+              <a:schemeClr val="lt1"/>
+            </a:fontRef>
+          </p:style>
+          <p:txBody>
+            <a:bodyPr rtlCol="0" anchor="ctr"/>
+            <a:lstStyle/>
+            <a:p>
+              <a:pPr algn="ctr"/>
+              <a:endParaRPr lang="en-IN"/>
+            </a:p>
+          </p:txBody>
+        </p:sp>
+        <p:sp>
+          <p:nvSpPr>
+            <p:cNvPr id="27" name="Rectangle 26">
+              <a:extLst>
+                <a:ext uri="{FF2B5EF4-FFF2-40B4-BE49-F238E27FC236}">
+                  <a16:creationId xmlns:a16="http://schemas.microsoft.com/office/drawing/2014/main" id="{CE04D72A-5701-24C0-2552-A727CF0E23E6}"/>
+                </a:ext>
+              </a:extLst>
+            </p:cNvPr>
+            <p:cNvSpPr/>
+            <p:nvPr/>
+          </p:nvSpPr>
+          <p:spPr>
+            <a:xfrm>
+              <a:off x="577970" y="431321"/>
+              <a:ext cx="2329132" cy="276999"/>
+            </a:xfrm>
+            <a:prstGeom prst="rect">
+              <a:avLst/>
+            </a:prstGeom>
+            <a:noFill/>
+            <a:ln>
+              <a:solidFill>
+                <a:srgbClr val="52C9BD"/>
+              </a:solidFill>
+            </a:ln>
+          </p:spPr>
+          <p:style>
+            <a:lnRef idx="2">
+              <a:schemeClr val="accent1">
+                <a:shade val="15000"/>
+              </a:schemeClr>
+            </a:lnRef>
+            <a:fillRef idx="1">
+              <a:schemeClr val="accent1"/>
+            </a:fillRef>
+            <a:effectRef idx="0">
+              <a:schemeClr val="accent1"/>
+            </a:effectRef>
+            <a:fontRef idx="minor">
+              <a:schemeClr val="lt1"/>
+            </a:fontRef>
+          </p:style>
+          <p:txBody>
+            <a:bodyPr rtlCol="0" anchor="ctr"/>
+            <a:lstStyle/>
+            <a:p>
+              <a:pPr algn="ctr"/>
+              <a:r>
+                <a:rPr lang="en-US" sz="1200" dirty="0">
+                  <a:solidFill>
+                    <a:srgbClr val="5D7373"/>
+                  </a:solidFill>
+                  <a:latin typeface="Avenir Next LT Pro" panose="020B0504020202020204" pitchFamily="34" charset="0"/>
+                </a:rPr>
+                <a:t>Media</a:t>
+              </a:r>
+              <a:endParaRPr lang="en-IN" sz="1200" dirty="0">
+                <a:solidFill>
+                  <a:srgbClr val="5D7373"/>
+                </a:solidFill>
+                <a:latin typeface="Avenir Next LT Pro" panose="020B0504020202020204" pitchFamily="34" charset="0"/>
+              </a:endParaRPr>
+            </a:p>
+          </p:txBody>
+        </p:sp>
+        <p:sp>
+          <p:nvSpPr>
+            <p:cNvPr id="28" name="TextBox 27">
+              <a:extLst>
+                <a:ext uri="{FF2B5EF4-FFF2-40B4-BE49-F238E27FC236}">
+                  <a16:creationId xmlns:a16="http://schemas.microsoft.com/office/drawing/2014/main" id="{B9DB998F-6B31-4E31-FEF7-B2409F5729FF}"/>
+                </a:ext>
+              </a:extLst>
+            </p:cNvPr>
+            <p:cNvSpPr txBox="1"/>
+            <p:nvPr/>
+          </p:nvSpPr>
+          <p:spPr>
+            <a:xfrm>
+              <a:off x="577970" y="791785"/>
+              <a:ext cx="2329131" cy="430887"/>
+            </a:xfrm>
+            <a:prstGeom prst="rect">
+              <a:avLst/>
+            </a:prstGeom>
+            <a:noFill/>
+          </p:spPr>
+          <p:txBody>
+            <a:bodyPr wrap="square" rtlCol="0">
+              <a:spAutoFit/>
+            </a:bodyPr>
+            <a:lstStyle/>
+            <a:p>
+              <a:r>
+                <a:rPr lang="en-US" sz="1100" dirty="0" err="1">
+                  <a:latin typeface="Avenir Next LT Pro" panose="020B0504020202020204" pitchFamily="34" charset="0"/>
+                </a:rPr>
+                <a:t>mediaId</a:t>
+              </a:r>
+              <a:endParaRPr lang="en-US" sz="1100" dirty="0">
+                <a:latin typeface="Avenir Next LT Pro" panose="020B0504020202020204" pitchFamily="34" charset="0"/>
+              </a:endParaRPr>
+            </a:p>
+            <a:p>
+              <a:r>
+                <a:rPr lang="en-US" sz="1100" dirty="0" err="1">
+                  <a:latin typeface="Avenir Next LT Pro" panose="020B0504020202020204" pitchFamily="34" charset="0"/>
+                </a:rPr>
+                <a:t>contentId</a:t>
+              </a:r>
+              <a:endParaRPr lang="en-US" sz="1100" dirty="0">
+                <a:latin typeface="Avenir Next LT Pro" panose="020B0504020202020204" pitchFamily="34" charset="0"/>
+              </a:endParaRPr>
+            </a:p>
+          </p:txBody>
+        </p:sp>
+      </p:grpSp>
+      <p:grpSp>
+        <p:nvGrpSpPr>
+          <p:cNvPr id="29" name="Group 28">
+            <a:extLst>
+              <a:ext uri="{FF2B5EF4-FFF2-40B4-BE49-F238E27FC236}">
+                <a16:creationId xmlns:a16="http://schemas.microsoft.com/office/drawing/2014/main" id="{3BD253B4-C2F7-581D-8FD3-A0D4E10CEC41}"/>
+              </a:ext>
+            </a:extLst>
+          </p:cNvPr>
+          <p:cNvGrpSpPr/>
+          <p:nvPr/>
+        </p:nvGrpSpPr>
+        <p:grpSpPr>
+          <a:xfrm>
+            <a:off x="9594590" y="4832773"/>
+            <a:ext cx="1676857" cy="864485"/>
+            <a:chOff x="577970" y="431321"/>
+            <a:chExt cx="2329132" cy="864485"/>
+          </a:xfrm>
+        </p:grpSpPr>
+        <p:sp>
+          <p:nvSpPr>
+            <p:cNvPr id="30" name="Rectangle 29">
+              <a:extLst>
+                <a:ext uri="{FF2B5EF4-FFF2-40B4-BE49-F238E27FC236}">
+                  <a16:creationId xmlns:a16="http://schemas.microsoft.com/office/drawing/2014/main" id="{B79BF685-19DE-E755-772A-5751E174FCD0}"/>
+                </a:ext>
+              </a:extLst>
+            </p:cNvPr>
+            <p:cNvSpPr/>
+            <p:nvPr/>
+          </p:nvSpPr>
+          <p:spPr>
+            <a:xfrm>
+              <a:off x="577970" y="431322"/>
+              <a:ext cx="2329132" cy="864484"/>
+            </a:xfrm>
+            <a:prstGeom prst="rect">
+              <a:avLst/>
+            </a:prstGeom>
+            <a:noFill/>
+            <a:ln>
+              <a:solidFill>
+                <a:srgbClr val="52C9BD"/>
+              </a:solidFill>
+            </a:ln>
+          </p:spPr>
+          <p:style>
+            <a:lnRef idx="2">
+              <a:schemeClr val="accent1">
+                <a:shade val="15000"/>
+              </a:schemeClr>
+            </a:lnRef>
+            <a:fillRef idx="1">
+              <a:schemeClr val="accent1"/>
+            </a:fillRef>
+            <a:effectRef idx="0">
+              <a:schemeClr val="accent1"/>
+            </a:effectRef>
+            <a:fontRef idx="minor">
+              <a:schemeClr val="lt1"/>
+            </a:fontRef>
+          </p:style>
+          <p:txBody>
+            <a:bodyPr rtlCol="0" anchor="ctr"/>
+            <a:lstStyle/>
+            <a:p>
+              <a:pPr algn="ctr"/>
+              <a:endParaRPr lang="en-IN" dirty="0"/>
+            </a:p>
+          </p:txBody>
+        </p:sp>
+        <p:sp>
+          <p:nvSpPr>
+            <p:cNvPr id="31" name="Rectangle 30">
+              <a:extLst>
+                <a:ext uri="{FF2B5EF4-FFF2-40B4-BE49-F238E27FC236}">
+                  <a16:creationId xmlns:a16="http://schemas.microsoft.com/office/drawing/2014/main" id="{338BF8A7-3B7C-AAF9-0D4E-7BB809B495F2}"/>
+                </a:ext>
+              </a:extLst>
+            </p:cNvPr>
+            <p:cNvSpPr/>
+            <p:nvPr/>
+          </p:nvSpPr>
+          <p:spPr>
+            <a:xfrm>
+              <a:off x="577970" y="431321"/>
+              <a:ext cx="2329132" cy="276999"/>
+            </a:xfrm>
+            <a:prstGeom prst="rect">
+              <a:avLst/>
+            </a:prstGeom>
+            <a:noFill/>
+            <a:ln>
+              <a:solidFill>
+                <a:srgbClr val="52C9BD"/>
+              </a:solidFill>
+            </a:ln>
+          </p:spPr>
+          <p:style>
+            <a:lnRef idx="2">
+              <a:schemeClr val="accent1">
+                <a:shade val="15000"/>
+              </a:schemeClr>
+            </a:lnRef>
+            <a:fillRef idx="1">
+              <a:schemeClr val="accent1"/>
+            </a:fillRef>
+            <a:effectRef idx="0">
+              <a:schemeClr val="accent1"/>
+            </a:effectRef>
+            <a:fontRef idx="minor">
+              <a:schemeClr val="lt1"/>
+            </a:fontRef>
+          </p:style>
+          <p:txBody>
+            <a:bodyPr rtlCol="0" anchor="ctr"/>
+            <a:lstStyle/>
+            <a:p>
+              <a:pPr algn="ctr"/>
+              <a:r>
+                <a:rPr lang="en-US" sz="1200" dirty="0">
+                  <a:solidFill>
+                    <a:srgbClr val="5D7373"/>
+                  </a:solidFill>
+                  <a:latin typeface="Avenir Next LT Pro" panose="020B0504020202020204" pitchFamily="34" charset="0"/>
+                </a:rPr>
+                <a:t>Meeting</a:t>
+              </a:r>
+              <a:endParaRPr lang="en-IN" sz="1200" dirty="0">
+                <a:solidFill>
+                  <a:srgbClr val="5D7373"/>
+                </a:solidFill>
+                <a:latin typeface="Avenir Next LT Pro" panose="020B0504020202020204" pitchFamily="34" charset="0"/>
+              </a:endParaRPr>
+            </a:p>
+          </p:txBody>
+        </p:sp>
+        <p:sp>
+          <p:nvSpPr>
+            <p:cNvPr id="32" name="TextBox 31">
+              <a:extLst>
+                <a:ext uri="{FF2B5EF4-FFF2-40B4-BE49-F238E27FC236}">
+                  <a16:creationId xmlns:a16="http://schemas.microsoft.com/office/drawing/2014/main" id="{2DD1A5B7-4517-8D60-B320-BB89599A3316}"/>
+                </a:ext>
+              </a:extLst>
+            </p:cNvPr>
+            <p:cNvSpPr txBox="1"/>
+            <p:nvPr/>
+          </p:nvSpPr>
+          <p:spPr>
+            <a:xfrm>
+              <a:off x="577970" y="791785"/>
+              <a:ext cx="2329131" cy="430887"/>
+            </a:xfrm>
+            <a:prstGeom prst="rect">
+              <a:avLst/>
+            </a:prstGeom>
+            <a:noFill/>
+          </p:spPr>
+          <p:txBody>
+            <a:bodyPr wrap="square" rtlCol="0">
+              <a:spAutoFit/>
+            </a:bodyPr>
+            <a:lstStyle/>
+            <a:p>
+              <a:r>
+                <a:rPr lang="en-US" sz="1100" dirty="0" err="1">
+                  <a:latin typeface="Avenir Next LT Pro" panose="020B0504020202020204" pitchFamily="34" charset="0"/>
+                </a:rPr>
+                <a:t>meetingId</a:t>
+              </a:r>
+              <a:endParaRPr lang="en-US" sz="1100" dirty="0">
+                <a:latin typeface="Avenir Next LT Pro" panose="020B0504020202020204" pitchFamily="34" charset="0"/>
+              </a:endParaRPr>
+            </a:p>
+            <a:p>
+              <a:r>
+                <a:rPr lang="en-US" sz="1100" dirty="0" err="1">
+                  <a:latin typeface="Avenir Next LT Pro" panose="020B0504020202020204" pitchFamily="34" charset="0"/>
+                </a:rPr>
+                <a:t>contentId</a:t>
+              </a:r>
+              <a:endParaRPr lang="en-US" sz="1100" dirty="0">
+                <a:latin typeface="Avenir Next LT Pro" panose="020B0504020202020204" pitchFamily="34" charset="0"/>
+              </a:endParaRPr>
+            </a:p>
+          </p:txBody>
+        </p:sp>
+      </p:grpSp>
+      <p:grpSp>
+        <p:nvGrpSpPr>
+          <p:cNvPr id="37" name="Group 36">
+            <a:extLst>
+              <a:ext uri="{FF2B5EF4-FFF2-40B4-BE49-F238E27FC236}">
+                <a16:creationId xmlns:a16="http://schemas.microsoft.com/office/drawing/2014/main" id="{09531D2C-B02B-8C2B-8F42-EEB7F2B8FBAC}"/>
+              </a:ext>
+            </a:extLst>
+          </p:cNvPr>
+          <p:cNvGrpSpPr/>
+          <p:nvPr/>
+        </p:nvGrpSpPr>
+        <p:grpSpPr>
+          <a:xfrm>
+            <a:off x="9594590" y="2897030"/>
+            <a:ext cx="1676857" cy="866971"/>
+            <a:chOff x="577970" y="431321"/>
+            <a:chExt cx="2329132" cy="866971"/>
+          </a:xfrm>
+        </p:grpSpPr>
+        <p:sp>
+          <p:nvSpPr>
+            <p:cNvPr id="38" name="Rectangle 37">
+              <a:extLst>
+                <a:ext uri="{FF2B5EF4-FFF2-40B4-BE49-F238E27FC236}">
+                  <a16:creationId xmlns:a16="http://schemas.microsoft.com/office/drawing/2014/main" id="{E8B9ADD5-A1E4-88D8-3741-8DF6C1B792B1}"/>
+                </a:ext>
+              </a:extLst>
+            </p:cNvPr>
+            <p:cNvSpPr/>
+            <p:nvPr/>
+          </p:nvSpPr>
+          <p:spPr>
+            <a:xfrm>
+              <a:off x="577970" y="431322"/>
+              <a:ext cx="2329132" cy="866970"/>
+            </a:xfrm>
+            <a:prstGeom prst="rect">
+              <a:avLst/>
+            </a:prstGeom>
+            <a:noFill/>
+            <a:ln>
+              <a:solidFill>
+                <a:srgbClr val="52C9BD"/>
+              </a:solidFill>
+            </a:ln>
+          </p:spPr>
+          <p:style>
+            <a:lnRef idx="2">
+              <a:schemeClr val="accent1">
+                <a:shade val="15000"/>
+              </a:schemeClr>
+            </a:lnRef>
+            <a:fillRef idx="1">
+              <a:schemeClr val="accent1"/>
+            </a:fillRef>
+            <a:effectRef idx="0">
+              <a:schemeClr val="accent1"/>
+            </a:effectRef>
+            <a:fontRef idx="minor">
+              <a:schemeClr val="lt1"/>
+            </a:fontRef>
+          </p:style>
+          <p:txBody>
+            <a:bodyPr rtlCol="0" anchor="ctr"/>
+            <a:lstStyle/>
+            <a:p>
+              <a:pPr algn="ctr"/>
+              <a:endParaRPr lang="en-IN" dirty="0"/>
+            </a:p>
+          </p:txBody>
+        </p:sp>
+        <p:sp>
+          <p:nvSpPr>
+            <p:cNvPr id="39" name="Rectangle 38">
+              <a:extLst>
+                <a:ext uri="{FF2B5EF4-FFF2-40B4-BE49-F238E27FC236}">
+                  <a16:creationId xmlns:a16="http://schemas.microsoft.com/office/drawing/2014/main" id="{582DC0AF-CBEA-7148-DC1C-6DF086773FEF}"/>
+                </a:ext>
+              </a:extLst>
+            </p:cNvPr>
+            <p:cNvSpPr/>
+            <p:nvPr/>
+          </p:nvSpPr>
+          <p:spPr>
+            <a:xfrm>
+              <a:off x="577970" y="431321"/>
+              <a:ext cx="2329132" cy="276999"/>
+            </a:xfrm>
+            <a:prstGeom prst="rect">
+              <a:avLst/>
+            </a:prstGeom>
+            <a:noFill/>
+            <a:ln>
+              <a:solidFill>
+                <a:srgbClr val="52C9BD"/>
+              </a:solidFill>
+            </a:ln>
+          </p:spPr>
+          <p:style>
+            <a:lnRef idx="2">
+              <a:schemeClr val="accent1">
+                <a:shade val="15000"/>
+              </a:schemeClr>
+            </a:lnRef>
+            <a:fillRef idx="1">
+              <a:schemeClr val="accent1"/>
+            </a:fillRef>
+            <a:effectRef idx="0">
+              <a:schemeClr val="accent1"/>
+            </a:effectRef>
+            <a:fontRef idx="minor">
+              <a:schemeClr val="lt1"/>
+            </a:fontRef>
+          </p:style>
+          <p:txBody>
+            <a:bodyPr rtlCol="0" anchor="ctr"/>
+            <a:lstStyle/>
+            <a:p>
+              <a:pPr algn="ctr"/>
+              <a:r>
+                <a:rPr lang="en-US" sz="1200" dirty="0">
+                  <a:solidFill>
+                    <a:srgbClr val="5D7373"/>
+                  </a:solidFill>
+                  <a:latin typeface="Avenir Next LT Pro" panose="020B0504020202020204" pitchFamily="34" charset="0"/>
+                </a:rPr>
+                <a:t>Text</a:t>
+              </a:r>
+              <a:endParaRPr lang="en-IN" sz="1200" dirty="0">
+                <a:solidFill>
+                  <a:srgbClr val="5D7373"/>
+                </a:solidFill>
+                <a:latin typeface="Avenir Next LT Pro" panose="020B0504020202020204" pitchFamily="34" charset="0"/>
+              </a:endParaRPr>
+            </a:p>
+          </p:txBody>
+        </p:sp>
+        <p:sp>
+          <p:nvSpPr>
+            <p:cNvPr id="40" name="TextBox 39">
+              <a:extLst>
+                <a:ext uri="{FF2B5EF4-FFF2-40B4-BE49-F238E27FC236}">
+                  <a16:creationId xmlns:a16="http://schemas.microsoft.com/office/drawing/2014/main" id="{94513BA4-CC0B-3ACD-26CE-E00C98784704}"/>
+                </a:ext>
+              </a:extLst>
+            </p:cNvPr>
+            <p:cNvSpPr txBox="1"/>
+            <p:nvPr/>
+          </p:nvSpPr>
+          <p:spPr>
+            <a:xfrm>
+              <a:off x="577970" y="791785"/>
+              <a:ext cx="2329131" cy="430887"/>
+            </a:xfrm>
+            <a:prstGeom prst="rect">
+              <a:avLst/>
+            </a:prstGeom>
+            <a:noFill/>
+          </p:spPr>
+          <p:txBody>
+            <a:bodyPr wrap="square" rtlCol="0">
+              <a:spAutoFit/>
+            </a:bodyPr>
+            <a:lstStyle/>
+            <a:p>
+              <a:r>
+                <a:rPr lang="en-US" sz="1100" dirty="0" err="1">
+                  <a:latin typeface="Avenir Next LT Pro" panose="020B0504020202020204" pitchFamily="34" charset="0"/>
+                </a:rPr>
+                <a:t>textId</a:t>
+              </a:r>
+              <a:endParaRPr lang="en-US" sz="1100" dirty="0">
+                <a:latin typeface="Avenir Next LT Pro" panose="020B0504020202020204" pitchFamily="34" charset="0"/>
+              </a:endParaRPr>
+            </a:p>
+            <a:p>
+              <a:r>
+                <a:rPr lang="en-US" sz="1100" dirty="0" err="1">
+                  <a:latin typeface="Avenir Next LT Pro" panose="020B0504020202020204" pitchFamily="34" charset="0"/>
+                </a:rPr>
+                <a:t>contentId</a:t>
+              </a:r>
+              <a:endParaRPr lang="en-US" sz="1100" dirty="0">
+                <a:latin typeface="Avenir Next LT Pro" panose="020B0504020202020204" pitchFamily="34" charset="0"/>
+              </a:endParaRPr>
+            </a:p>
+          </p:txBody>
+        </p:sp>
+      </p:grpSp>
+      <p:grpSp>
+        <p:nvGrpSpPr>
+          <p:cNvPr id="41" name="Group 40">
+            <a:extLst>
+              <a:ext uri="{FF2B5EF4-FFF2-40B4-BE49-F238E27FC236}">
+                <a16:creationId xmlns:a16="http://schemas.microsoft.com/office/drawing/2014/main" id="{0F9C38A5-3DA9-2514-E563-7E533C703511}"/>
+              </a:ext>
+            </a:extLst>
+          </p:cNvPr>
+          <p:cNvGrpSpPr/>
+          <p:nvPr/>
+        </p:nvGrpSpPr>
+        <p:grpSpPr>
+          <a:xfrm>
+            <a:off x="9594590" y="3862964"/>
+            <a:ext cx="1676857" cy="866971"/>
+            <a:chOff x="577970" y="431321"/>
+            <a:chExt cx="2329132" cy="866971"/>
+          </a:xfrm>
+        </p:grpSpPr>
+        <p:sp>
+          <p:nvSpPr>
+            <p:cNvPr id="42" name="Rectangle 41">
+              <a:extLst>
+                <a:ext uri="{FF2B5EF4-FFF2-40B4-BE49-F238E27FC236}">
+                  <a16:creationId xmlns:a16="http://schemas.microsoft.com/office/drawing/2014/main" id="{54FA1C6A-619B-16BD-3D7E-A32602A9240E}"/>
+                </a:ext>
+              </a:extLst>
+            </p:cNvPr>
+            <p:cNvSpPr/>
+            <p:nvPr/>
+          </p:nvSpPr>
+          <p:spPr>
+            <a:xfrm>
+              <a:off x="577970" y="431322"/>
+              <a:ext cx="2329132" cy="866970"/>
+            </a:xfrm>
+            <a:prstGeom prst="rect">
+              <a:avLst/>
+            </a:prstGeom>
+            <a:noFill/>
+            <a:ln>
+              <a:solidFill>
+                <a:srgbClr val="52C9BD"/>
+              </a:solidFill>
+            </a:ln>
+          </p:spPr>
+          <p:style>
+            <a:lnRef idx="2">
+              <a:schemeClr val="accent1">
+                <a:shade val="15000"/>
+              </a:schemeClr>
+            </a:lnRef>
+            <a:fillRef idx="1">
+              <a:schemeClr val="accent1"/>
+            </a:fillRef>
+            <a:effectRef idx="0">
+              <a:schemeClr val="accent1"/>
+            </a:effectRef>
+            <a:fontRef idx="minor">
+              <a:schemeClr val="lt1"/>
+            </a:fontRef>
+          </p:style>
+          <p:txBody>
+            <a:bodyPr rtlCol="0" anchor="ctr"/>
+            <a:lstStyle/>
+            <a:p>
+              <a:pPr algn="ctr"/>
+              <a:endParaRPr lang="en-IN"/>
+            </a:p>
+          </p:txBody>
+        </p:sp>
+        <p:sp>
+          <p:nvSpPr>
+            <p:cNvPr id="43" name="Rectangle 42">
+              <a:extLst>
+                <a:ext uri="{FF2B5EF4-FFF2-40B4-BE49-F238E27FC236}">
+                  <a16:creationId xmlns:a16="http://schemas.microsoft.com/office/drawing/2014/main" id="{0760A0C3-5C1B-BC8C-3FE5-C823352E7B49}"/>
+                </a:ext>
+              </a:extLst>
+            </p:cNvPr>
+            <p:cNvSpPr/>
+            <p:nvPr/>
+          </p:nvSpPr>
+          <p:spPr>
+            <a:xfrm>
+              <a:off x="577970" y="431321"/>
+              <a:ext cx="2329132" cy="276999"/>
+            </a:xfrm>
+            <a:prstGeom prst="rect">
+              <a:avLst/>
+            </a:prstGeom>
+            <a:noFill/>
+            <a:ln>
+              <a:solidFill>
+                <a:srgbClr val="52C9BD"/>
+              </a:solidFill>
+            </a:ln>
+          </p:spPr>
+          <p:style>
+            <a:lnRef idx="2">
+              <a:schemeClr val="accent1">
+                <a:shade val="15000"/>
+              </a:schemeClr>
+            </a:lnRef>
+            <a:fillRef idx="1">
+              <a:schemeClr val="accent1"/>
+            </a:fillRef>
+            <a:effectRef idx="0">
+              <a:schemeClr val="accent1"/>
+            </a:effectRef>
+            <a:fontRef idx="minor">
+              <a:schemeClr val="lt1"/>
+            </a:fontRef>
+          </p:style>
+          <p:txBody>
+            <a:bodyPr rtlCol="0" anchor="ctr"/>
+            <a:lstStyle/>
+            <a:p>
+              <a:pPr algn="ctr"/>
+              <a:r>
+                <a:rPr lang="en-US" sz="1200" dirty="0">
+                  <a:solidFill>
+                    <a:srgbClr val="5D7373"/>
+                  </a:solidFill>
+                  <a:latin typeface="Avenir Next LT Pro" panose="020B0504020202020204" pitchFamily="34" charset="0"/>
+                </a:rPr>
+                <a:t>Payment</a:t>
+              </a:r>
+              <a:endParaRPr lang="en-IN" sz="1200" dirty="0">
+                <a:solidFill>
+                  <a:srgbClr val="5D7373"/>
+                </a:solidFill>
+                <a:latin typeface="Avenir Next LT Pro" panose="020B0504020202020204" pitchFamily="34" charset="0"/>
+              </a:endParaRPr>
+            </a:p>
+          </p:txBody>
+        </p:sp>
+        <p:sp>
+          <p:nvSpPr>
+            <p:cNvPr id="44" name="TextBox 43">
+              <a:extLst>
+                <a:ext uri="{FF2B5EF4-FFF2-40B4-BE49-F238E27FC236}">
+                  <a16:creationId xmlns:a16="http://schemas.microsoft.com/office/drawing/2014/main" id="{BCBFB1FC-D26D-859A-E8A6-ECB98FEF9E0D}"/>
+                </a:ext>
+              </a:extLst>
+            </p:cNvPr>
+            <p:cNvSpPr txBox="1"/>
+            <p:nvPr/>
+          </p:nvSpPr>
+          <p:spPr>
+            <a:xfrm>
+              <a:off x="577970" y="791785"/>
+              <a:ext cx="2329131" cy="430887"/>
+            </a:xfrm>
+            <a:prstGeom prst="rect">
+              <a:avLst/>
+            </a:prstGeom>
+            <a:noFill/>
+          </p:spPr>
+          <p:txBody>
+            <a:bodyPr wrap="square" rtlCol="0">
+              <a:spAutoFit/>
+            </a:bodyPr>
+            <a:lstStyle/>
+            <a:p>
+              <a:r>
+                <a:rPr lang="en-US" sz="1100" dirty="0" err="1">
+                  <a:latin typeface="Avenir Next LT Pro" panose="020B0504020202020204" pitchFamily="34" charset="0"/>
+                </a:rPr>
+                <a:t>paymentId</a:t>
+              </a:r>
+              <a:endParaRPr lang="en-US" sz="1100" dirty="0">
+                <a:latin typeface="Avenir Next LT Pro" panose="020B0504020202020204" pitchFamily="34" charset="0"/>
+              </a:endParaRPr>
+            </a:p>
+            <a:p>
+              <a:r>
+                <a:rPr lang="en-US" sz="1100" dirty="0" err="1">
+                  <a:latin typeface="Avenir Next LT Pro" panose="020B0504020202020204" pitchFamily="34" charset="0"/>
+                </a:rPr>
+                <a:t>contentId</a:t>
+              </a:r>
+              <a:endParaRPr lang="en-US" sz="1100" dirty="0">
+                <a:latin typeface="Avenir Next LT Pro" panose="020B0504020202020204" pitchFamily="34" charset="0"/>
+              </a:endParaRPr>
+            </a:p>
+          </p:txBody>
+        </p:sp>
+      </p:grpSp>
+      <p:grpSp>
+        <p:nvGrpSpPr>
+          <p:cNvPr id="50" name="Group 49">
+            <a:extLst>
+              <a:ext uri="{FF2B5EF4-FFF2-40B4-BE49-F238E27FC236}">
+                <a16:creationId xmlns:a16="http://schemas.microsoft.com/office/drawing/2014/main" id="{BD491617-295F-D6D6-0BEB-1EEA81C45AB6}"/>
+              </a:ext>
+            </a:extLst>
+          </p:cNvPr>
+          <p:cNvGrpSpPr/>
+          <p:nvPr/>
+        </p:nvGrpSpPr>
+        <p:grpSpPr>
+          <a:xfrm>
+            <a:off x="6169201" y="3270609"/>
+            <a:ext cx="2329131" cy="165347"/>
+            <a:chOff x="6944264" y="3270609"/>
+            <a:chExt cx="2329131" cy="165347"/>
+          </a:xfrm>
+        </p:grpSpPr>
+        <p:cxnSp>
+          <p:nvCxnSpPr>
+            <p:cNvPr id="5" name="Straight Arrow Connector 4">
+              <a:extLst>
+                <a:ext uri="{FF2B5EF4-FFF2-40B4-BE49-F238E27FC236}">
+                  <a16:creationId xmlns:a16="http://schemas.microsoft.com/office/drawing/2014/main" id="{5D133E11-8C2A-F05D-559E-20B4BB09C3A3}"/>
+                </a:ext>
+              </a:extLst>
+            </p:cNvPr>
+            <p:cNvCxnSpPr>
+              <a:cxnSpLocks/>
+            </p:cNvCxnSpPr>
+            <p:nvPr/>
+          </p:nvCxnSpPr>
+          <p:spPr>
+            <a:xfrm>
+              <a:off x="6944264" y="3357115"/>
+              <a:ext cx="2311879" cy="0"/>
+            </a:xfrm>
+            <a:prstGeom prst="straightConnector1">
+              <a:avLst/>
+            </a:prstGeom>
+            <a:ln w="19050">
+              <a:solidFill>
+                <a:srgbClr val="05E1E7"/>
+              </a:solidFill>
+              <a:tailEnd type="triangle"/>
+            </a:ln>
+          </p:spPr>
+          <p:style>
+            <a:lnRef idx="1">
+              <a:schemeClr val="accent1"/>
+            </a:lnRef>
+            <a:fillRef idx="0">
+              <a:schemeClr val="accent1"/>
+            </a:fillRef>
+            <a:effectRef idx="0">
+              <a:schemeClr val="accent1"/>
+            </a:effectRef>
+            <a:fontRef idx="minor">
+              <a:schemeClr val="tx1"/>
+            </a:fontRef>
+          </p:style>
+        </p:cxnSp>
+        <p:sp>
+          <p:nvSpPr>
+            <p:cNvPr id="49" name="Oval 48">
+              <a:extLst>
+                <a:ext uri="{FF2B5EF4-FFF2-40B4-BE49-F238E27FC236}">
+                  <a16:creationId xmlns:a16="http://schemas.microsoft.com/office/drawing/2014/main" id="{3CFC7BAB-1B51-7958-2E98-77106E8A712F}"/>
+                </a:ext>
+              </a:extLst>
+            </p:cNvPr>
+            <p:cNvSpPr/>
+            <p:nvPr/>
+          </p:nvSpPr>
+          <p:spPr>
+            <a:xfrm>
+              <a:off x="9108048" y="3270609"/>
+              <a:ext cx="165347" cy="165347"/>
+            </a:xfrm>
+            <a:prstGeom prst="ellipse">
+              <a:avLst/>
+            </a:prstGeom>
+            <a:solidFill>
+              <a:srgbClr val="05E1E7"/>
+            </a:solidFill>
+            <a:ln>
+              <a:solidFill>
+                <a:srgbClr val="05E1E7"/>
+              </a:solidFill>
+            </a:ln>
+          </p:spPr>
+          <p:style>
+            <a:lnRef idx="2">
+              <a:schemeClr val="accent1">
+                <a:shade val="15000"/>
+              </a:schemeClr>
+            </a:lnRef>
+            <a:fillRef idx="1">
+              <a:schemeClr val="accent1"/>
+            </a:fillRef>
+            <a:effectRef idx="0">
+              <a:schemeClr val="accent1"/>
+            </a:effectRef>
+            <a:fontRef idx="minor">
+              <a:schemeClr val="lt1"/>
+            </a:fontRef>
+          </p:style>
+          <p:txBody>
+            <a:bodyPr rtlCol="0" anchor="ctr"/>
+            <a:lstStyle/>
+            <a:p>
+              <a:pPr algn="ctr"/>
+              <a:endParaRPr lang="en-IN"/>
+            </a:p>
+          </p:txBody>
+        </p:sp>
+      </p:grpSp>
+      <p:cxnSp>
+        <p:nvCxnSpPr>
+          <p:cNvPr id="54" name="Connector: Elbow 53">
+            <a:extLst>
+              <a:ext uri="{FF2B5EF4-FFF2-40B4-BE49-F238E27FC236}">
+                <a16:creationId xmlns:a16="http://schemas.microsoft.com/office/drawing/2014/main" id="{26EF4219-6D8A-57D2-7586-5FF20E8D7652}"/>
+              </a:ext>
+            </a:extLst>
+          </p:cNvPr>
+          <p:cNvCxnSpPr>
+            <a:cxnSpLocks/>
+            <a:stCxn id="49" idx="0"/>
+          </p:cNvCxnSpPr>
+          <p:nvPr/>
+        </p:nvCxnSpPr>
+        <p:spPr>
+          <a:xfrm rot="5400000" flipH="1" flipV="1">
+            <a:off x="7739881" y="1368805"/>
+            <a:ext cx="2577582" cy="1226026"/>
+          </a:xfrm>
+          <a:prstGeom prst="bentConnector3">
+            <a:avLst>
+              <a:gd name="adj1" fmla="val 99697"/>
+            </a:avLst>
+          </a:prstGeom>
+          <a:ln w="19050">
+            <a:solidFill>
+              <a:srgbClr val="05E1E7"/>
+            </a:solidFill>
+            <a:tailEnd type="triangle"/>
+          </a:ln>
+        </p:spPr>
+        <p:style>
+          <a:lnRef idx="1">
+            <a:schemeClr val="accent1"/>
+          </a:lnRef>
+          <a:fillRef idx="0">
+            <a:schemeClr val="accent1"/>
+          </a:fillRef>
+          <a:effectRef idx="0">
+            <a:schemeClr val="accent1"/>
+          </a:effectRef>
+          <a:fontRef idx="minor">
+            <a:schemeClr val="tx1"/>
+          </a:fontRef>
+        </p:style>
+      </p:cxnSp>
+      <p:cxnSp>
+        <p:nvCxnSpPr>
+          <p:cNvPr id="70" name="Straight Arrow Connector 69">
+            <a:extLst>
+              <a:ext uri="{FF2B5EF4-FFF2-40B4-BE49-F238E27FC236}">
+                <a16:creationId xmlns:a16="http://schemas.microsoft.com/office/drawing/2014/main" id="{BD45B390-9163-BCEB-5AAF-758445A97BF5}"/>
+              </a:ext>
+            </a:extLst>
+          </p:cNvPr>
+          <p:cNvCxnSpPr>
+            <a:cxnSpLocks/>
+          </p:cNvCxnSpPr>
+          <p:nvPr/>
+        </p:nvCxnSpPr>
+        <p:spPr>
+          <a:xfrm>
+            <a:off x="8415658" y="1680714"/>
+            <a:ext cx="1238613" cy="0"/>
+          </a:xfrm>
+          <a:prstGeom prst="straightConnector1">
+            <a:avLst/>
+          </a:prstGeom>
+          <a:ln w="19050">
+            <a:solidFill>
+              <a:srgbClr val="05E1E7"/>
+            </a:solidFill>
+            <a:tailEnd type="triangle"/>
+          </a:ln>
+        </p:spPr>
+        <p:style>
+          <a:lnRef idx="1">
+            <a:schemeClr val="accent1"/>
+          </a:lnRef>
+          <a:fillRef idx="0">
+            <a:schemeClr val="accent1"/>
+          </a:fillRef>
+          <a:effectRef idx="0">
+            <a:schemeClr val="accent1"/>
+          </a:effectRef>
+          <a:fontRef idx="minor">
+            <a:schemeClr val="tx1"/>
+          </a:fontRef>
+        </p:style>
+      </p:cxnSp>
+      <p:cxnSp>
+        <p:nvCxnSpPr>
+          <p:cNvPr id="72" name="Straight Arrow Connector 71">
+            <a:extLst>
+              <a:ext uri="{FF2B5EF4-FFF2-40B4-BE49-F238E27FC236}">
+                <a16:creationId xmlns:a16="http://schemas.microsoft.com/office/drawing/2014/main" id="{7C435D19-8C30-00E4-DF88-F45FA7F54413}"/>
+              </a:ext>
+            </a:extLst>
+          </p:cNvPr>
+          <p:cNvCxnSpPr>
+            <a:cxnSpLocks/>
+          </p:cNvCxnSpPr>
+          <p:nvPr/>
+        </p:nvCxnSpPr>
+        <p:spPr>
+          <a:xfrm>
+            <a:off x="8403072" y="2631257"/>
+            <a:ext cx="1238613" cy="0"/>
+          </a:xfrm>
+          <a:prstGeom prst="straightConnector1">
+            <a:avLst/>
+          </a:prstGeom>
+          <a:ln w="19050">
+            <a:solidFill>
+              <a:srgbClr val="05E1E7"/>
+            </a:solidFill>
+            <a:tailEnd type="triangle"/>
+          </a:ln>
+        </p:spPr>
+        <p:style>
+          <a:lnRef idx="1">
+            <a:schemeClr val="accent1"/>
+          </a:lnRef>
+          <a:fillRef idx="0">
+            <a:schemeClr val="accent1"/>
+          </a:fillRef>
+          <a:effectRef idx="0">
+            <a:schemeClr val="accent1"/>
+          </a:effectRef>
+          <a:fontRef idx="minor">
+            <a:schemeClr val="tx1"/>
+          </a:fontRef>
+        </p:style>
+      </p:cxnSp>
+      <p:cxnSp>
+        <p:nvCxnSpPr>
+          <p:cNvPr id="73" name="Straight Arrow Connector 72">
+            <a:extLst>
+              <a:ext uri="{FF2B5EF4-FFF2-40B4-BE49-F238E27FC236}">
+                <a16:creationId xmlns:a16="http://schemas.microsoft.com/office/drawing/2014/main" id="{D67FF17B-2202-0133-7987-61BC96BAEAAA}"/>
+              </a:ext>
+            </a:extLst>
+          </p:cNvPr>
+          <p:cNvCxnSpPr>
+            <a:cxnSpLocks/>
+          </p:cNvCxnSpPr>
+          <p:nvPr/>
+        </p:nvCxnSpPr>
+        <p:spPr>
+          <a:xfrm>
+            <a:off x="8416613" y="3581800"/>
+            <a:ext cx="1238613" cy="0"/>
+          </a:xfrm>
+          <a:prstGeom prst="straightConnector1">
+            <a:avLst/>
+          </a:prstGeom>
+          <a:ln w="19050">
+            <a:solidFill>
+              <a:srgbClr val="05E1E7"/>
+            </a:solidFill>
+            <a:tailEnd type="triangle"/>
+          </a:ln>
+        </p:spPr>
+        <p:style>
+          <a:lnRef idx="1">
+            <a:schemeClr val="accent1"/>
+          </a:lnRef>
+          <a:fillRef idx="0">
+            <a:schemeClr val="accent1"/>
+          </a:fillRef>
+          <a:effectRef idx="0">
+            <a:schemeClr val="accent1"/>
+          </a:effectRef>
+          <a:fontRef idx="minor">
+            <a:schemeClr val="tx1"/>
+          </a:fontRef>
+        </p:style>
+      </p:cxnSp>
+      <p:cxnSp>
+        <p:nvCxnSpPr>
+          <p:cNvPr id="74" name="Straight Arrow Connector 73">
+            <a:extLst>
+              <a:ext uri="{FF2B5EF4-FFF2-40B4-BE49-F238E27FC236}">
+                <a16:creationId xmlns:a16="http://schemas.microsoft.com/office/drawing/2014/main" id="{694A9810-4406-B6A5-9721-557D81446F20}"/>
+              </a:ext>
+            </a:extLst>
+          </p:cNvPr>
+          <p:cNvCxnSpPr>
+            <a:cxnSpLocks/>
+          </p:cNvCxnSpPr>
+          <p:nvPr/>
+        </p:nvCxnSpPr>
+        <p:spPr>
+          <a:xfrm>
+            <a:off x="8446244" y="4531901"/>
+            <a:ext cx="1238613" cy="0"/>
+          </a:xfrm>
+          <a:prstGeom prst="straightConnector1">
+            <a:avLst/>
+          </a:prstGeom>
+          <a:ln w="19050">
+            <a:solidFill>
+              <a:srgbClr val="05E1E7"/>
+            </a:solidFill>
+            <a:tailEnd type="triangle"/>
+          </a:ln>
+        </p:spPr>
+        <p:style>
+          <a:lnRef idx="1">
+            <a:schemeClr val="accent1"/>
+          </a:lnRef>
+          <a:fillRef idx="0">
+            <a:schemeClr val="accent1"/>
+          </a:fillRef>
+          <a:effectRef idx="0">
+            <a:schemeClr val="accent1"/>
+          </a:effectRef>
+          <a:fontRef idx="minor">
+            <a:schemeClr val="tx1"/>
+          </a:fontRef>
+        </p:style>
+      </p:cxnSp>
+      <p:cxnSp>
+        <p:nvCxnSpPr>
+          <p:cNvPr id="75" name="Straight Arrow Connector 74">
+            <a:extLst>
+              <a:ext uri="{FF2B5EF4-FFF2-40B4-BE49-F238E27FC236}">
+                <a16:creationId xmlns:a16="http://schemas.microsoft.com/office/drawing/2014/main" id="{364B6091-66C5-3A42-3B4E-4F92E0360D91}"/>
+              </a:ext>
+            </a:extLst>
+          </p:cNvPr>
+          <p:cNvCxnSpPr>
+            <a:cxnSpLocks/>
+          </p:cNvCxnSpPr>
+          <p:nvPr/>
+        </p:nvCxnSpPr>
+        <p:spPr>
+          <a:xfrm>
+            <a:off x="8445898" y="5517720"/>
+            <a:ext cx="1238613" cy="0"/>
+          </a:xfrm>
+          <a:prstGeom prst="straightConnector1">
+            <a:avLst/>
+          </a:prstGeom>
+          <a:ln w="19050">
+            <a:solidFill>
+              <a:srgbClr val="05E1E7"/>
+            </a:solidFill>
+            <a:tailEnd type="triangle"/>
+          </a:ln>
+        </p:spPr>
+        <p:style>
+          <a:lnRef idx="1">
+            <a:schemeClr val="accent1"/>
+          </a:lnRef>
+          <a:fillRef idx="0">
+            <a:schemeClr val="accent1"/>
+          </a:fillRef>
+          <a:effectRef idx="0">
+            <a:schemeClr val="accent1"/>
+          </a:effectRef>
+          <a:fontRef idx="minor">
+            <a:schemeClr val="tx1"/>
+          </a:fontRef>
+        </p:style>
+      </p:cxnSp>
+      <p:cxnSp>
+        <p:nvCxnSpPr>
+          <p:cNvPr id="76" name="Straight Arrow Connector 75">
+            <a:extLst>
+              <a:ext uri="{FF2B5EF4-FFF2-40B4-BE49-F238E27FC236}">
+                <a16:creationId xmlns:a16="http://schemas.microsoft.com/office/drawing/2014/main" id="{86E18FC7-88A1-01F8-93FB-A59A97598268}"/>
+              </a:ext>
+            </a:extLst>
+          </p:cNvPr>
+          <p:cNvCxnSpPr>
+            <a:cxnSpLocks/>
+          </p:cNvCxnSpPr>
+          <p:nvPr/>
+        </p:nvCxnSpPr>
+        <p:spPr>
+          <a:xfrm>
+            <a:off x="8460157" y="6529224"/>
+            <a:ext cx="1238613" cy="0"/>
+          </a:xfrm>
+          <a:prstGeom prst="straightConnector1">
+            <a:avLst/>
+          </a:prstGeom>
+          <a:ln w="19050">
+            <a:solidFill>
+              <a:srgbClr val="05E1E7"/>
+            </a:solidFill>
+            <a:tailEnd type="triangle"/>
+          </a:ln>
+        </p:spPr>
+        <p:style>
+          <a:lnRef idx="1">
+            <a:schemeClr val="accent1"/>
+          </a:lnRef>
+          <a:fillRef idx="0">
+            <a:schemeClr val="accent1"/>
+          </a:fillRef>
+          <a:effectRef idx="0">
+            <a:schemeClr val="accent1"/>
+          </a:effectRef>
+          <a:fontRef idx="minor">
+            <a:schemeClr val="tx1"/>
+          </a:fontRef>
+        </p:style>
+      </p:cxnSp>
+      <p:cxnSp>
+        <p:nvCxnSpPr>
+          <p:cNvPr id="81" name="Straight Connector 80">
+            <a:extLst>
+              <a:ext uri="{FF2B5EF4-FFF2-40B4-BE49-F238E27FC236}">
+                <a16:creationId xmlns:a16="http://schemas.microsoft.com/office/drawing/2014/main" id="{8D659458-259C-F87F-0609-A95B0190FAB3}"/>
+              </a:ext>
+            </a:extLst>
+          </p:cNvPr>
+          <p:cNvCxnSpPr>
+            <a:cxnSpLocks/>
+          </p:cNvCxnSpPr>
+          <p:nvPr/>
+        </p:nvCxnSpPr>
+        <p:spPr>
+          <a:xfrm>
+            <a:off x="8417540" y="3398405"/>
+            <a:ext cx="28358" cy="3130819"/>
+          </a:xfrm>
+          <a:prstGeom prst="line">
+            <a:avLst/>
+          </a:prstGeom>
+          <a:ln w="19050">
+            <a:solidFill>
+              <a:srgbClr val="05E1E7"/>
+            </a:solidFill>
+          </a:ln>
+        </p:spPr>
+        <p:style>
+          <a:lnRef idx="1">
+            <a:schemeClr val="accent1"/>
+          </a:lnRef>
+          <a:fillRef idx="0">
+            <a:schemeClr val="accent1"/>
+          </a:fillRef>
+          <a:effectRef idx="0">
+            <a:schemeClr val="accent1"/>
+          </a:effectRef>
+          <a:fontRef idx="minor">
+            <a:schemeClr val="tx1"/>
+          </a:fontRef>
+        </p:style>
+      </p:cxnSp>
+      <p:sp>
+        <p:nvSpPr>
+          <p:cNvPr id="99" name="TextBox 98">
+            <a:extLst>
+              <a:ext uri="{FF2B5EF4-FFF2-40B4-BE49-F238E27FC236}">
+                <a16:creationId xmlns:a16="http://schemas.microsoft.com/office/drawing/2014/main" id="{B3586527-EF45-E617-6346-DE1072A35900}"/>
+              </a:ext>
+            </a:extLst>
+          </p:cNvPr>
+          <p:cNvSpPr txBox="1"/>
+          <p:nvPr/>
+        </p:nvSpPr>
+        <p:spPr>
+          <a:xfrm>
+            <a:off x="114115" y="99582"/>
+            <a:ext cx="3483100" cy="1446550"/>
+          </a:xfrm>
+          <a:prstGeom prst="rect">
+            <a:avLst/>
+          </a:prstGeom>
+          <a:noFill/>
+        </p:spPr>
+        <p:txBody>
+          <a:bodyPr wrap="square" rtlCol="0">
+            <a:spAutoFit/>
+          </a:bodyPr>
+          <a:lstStyle/>
+          <a:p>
+            <a:r>
+              <a:rPr lang="en-US" sz="1100" b="1" dirty="0" err="1">
+                <a:latin typeface="Avenir Next LT Pro" panose="020B0504020202020204" pitchFamily="34" charset="0"/>
+              </a:rPr>
+              <a:t>ContentID</a:t>
+            </a:r>
+            <a:r>
+              <a:rPr lang="en-US" sz="1100" b="1" dirty="0">
+                <a:latin typeface="Avenir Next LT Pro" panose="020B0504020202020204" pitchFamily="34" charset="0"/>
+              </a:rPr>
+              <a:t> </a:t>
+            </a:r>
+            <a:r>
+              <a:rPr lang="en-US" sz="1100" dirty="0">
+                <a:latin typeface="Avenir Next LT Pro" panose="020B0504020202020204" pitchFamily="34" charset="0"/>
+              </a:rPr>
+              <a:t>code for differentiating content</a:t>
+            </a:r>
+            <a:endParaRPr lang="en-US" sz="1100" b="1" dirty="0">
+              <a:latin typeface="Avenir Next LT Pro" panose="020B0504020202020204" pitchFamily="34" charset="0"/>
+            </a:endParaRPr>
+          </a:p>
+          <a:p>
+            <a:pPr marL="228600" indent="-228600">
+              <a:buAutoNum type="arabicPeriod"/>
+            </a:pPr>
+            <a:r>
+              <a:rPr lang="en-US" sz="1100" dirty="0">
+                <a:latin typeface="Avenir Next LT Pro" panose="020B0504020202020204" pitchFamily="34" charset="0"/>
+              </a:rPr>
+              <a:t>Location: AA</a:t>
+            </a:r>
+          </a:p>
+          <a:p>
+            <a:pPr marL="228600" indent="-228600">
+              <a:buAutoNum type="arabicPeriod"/>
+            </a:pPr>
+            <a:r>
+              <a:rPr lang="en-US" sz="1100" dirty="0">
+                <a:latin typeface="Avenir Next LT Pro" panose="020B0504020202020204" pitchFamily="34" charset="0"/>
+              </a:rPr>
+              <a:t>Media: AB</a:t>
+            </a:r>
+          </a:p>
+          <a:p>
+            <a:pPr marL="228600" indent="-228600">
+              <a:buAutoNum type="arabicPeriod"/>
+            </a:pPr>
+            <a:r>
+              <a:rPr lang="en-US" sz="1100" dirty="0">
+                <a:latin typeface="Avenir Next LT Pro" panose="020B0504020202020204" pitchFamily="34" charset="0"/>
+              </a:rPr>
+              <a:t>File: AC</a:t>
+            </a:r>
+          </a:p>
+          <a:p>
+            <a:pPr marL="228600" indent="-228600">
+              <a:buAutoNum type="arabicPeriod"/>
+            </a:pPr>
+            <a:r>
+              <a:rPr lang="en-US" sz="1100" dirty="0">
+                <a:latin typeface="Avenir Next LT Pro" panose="020B0504020202020204" pitchFamily="34" charset="0"/>
+              </a:rPr>
+              <a:t>Text: AD</a:t>
+            </a:r>
+          </a:p>
+          <a:p>
+            <a:pPr marL="228600" indent="-228600">
+              <a:buAutoNum type="arabicPeriod"/>
+            </a:pPr>
+            <a:r>
+              <a:rPr lang="en-US" sz="1100" dirty="0">
+                <a:latin typeface="Avenir Next LT Pro" panose="020B0504020202020204" pitchFamily="34" charset="0"/>
+              </a:rPr>
+              <a:t>Payment: AE</a:t>
+            </a:r>
+          </a:p>
+          <a:p>
+            <a:pPr marL="228600" indent="-228600">
+              <a:buAutoNum type="arabicPeriod"/>
+            </a:pPr>
+            <a:r>
+              <a:rPr lang="en-US" sz="1100" dirty="0">
+                <a:latin typeface="Avenir Next LT Pro" panose="020B0504020202020204" pitchFamily="34" charset="0"/>
+              </a:rPr>
+              <a:t>Meeting: AF</a:t>
+            </a:r>
+          </a:p>
+          <a:p>
+            <a:pPr marL="228600" indent="-228600">
+              <a:buAutoNum type="arabicPeriod"/>
+            </a:pPr>
+            <a:r>
+              <a:rPr lang="en-US" sz="1100" dirty="0" err="1">
+                <a:latin typeface="Avenir Next LT Pro" panose="020B0504020202020204" pitchFamily="34" charset="0"/>
+              </a:rPr>
+              <a:t>CallUp</a:t>
+            </a:r>
+            <a:r>
+              <a:rPr lang="en-US" sz="1100" dirty="0">
+                <a:latin typeface="Avenir Next LT Pro" panose="020B0504020202020204" pitchFamily="34" charset="0"/>
+              </a:rPr>
+              <a:t>: AG</a:t>
+            </a:r>
+          </a:p>
+        </p:txBody>
+      </p:sp>
+    </p:spTree>
+    <p:extLst>
+      <p:ext uri="{BB962C8B-B14F-4D97-AF65-F5344CB8AC3E}">
+        <p14:creationId xmlns:p14="http://schemas.microsoft.com/office/powerpoint/2010/main" val="1343447150"/>
       </p:ext>
     </p:extLst>
   </p:cSld>
@@ -11594,20 +13859,20 @@
 </file>
 
 <file path=customXml/item1.xml><?xml version="1.0" encoding="utf-8"?>
+<p:properties xmlns:p="http://schemas.microsoft.com/office/2006/metadata/properties" xmlns:xsi="http://www.w3.org/2001/XMLSchema-instance" xmlns:pc="http://schemas.microsoft.com/office/infopath/2007/PartnerControls">
+  <documentManagement>
+    <_activity xmlns="0e1bb11d-1fe8-4e80-a80d-c671e8cd2a50" xsi:nil="true"/>
+  </documentManagement>
+</p:properties>
+</file>
+
+<file path=customXml/item2.xml><?xml version="1.0" encoding="utf-8"?>
 <?mso-contentType ?>
 <FormTemplates xmlns="http://schemas.microsoft.com/sharepoint/v3/contenttype/forms">
   <Display>DocumentLibraryForm</Display>
   <Edit>DocumentLibraryForm</Edit>
   <New>DocumentLibraryForm</New>
 </FormTemplates>
-</file>
-
-<file path=customXml/item2.xml><?xml version="1.0" encoding="utf-8"?>
-<p:properties xmlns:p="http://schemas.microsoft.com/office/2006/metadata/properties" xmlns:xsi="http://www.w3.org/2001/XMLSchema-instance" xmlns:pc="http://schemas.microsoft.com/office/infopath/2007/PartnerControls">
-  <documentManagement>
-    <_activity xmlns="0e1bb11d-1fe8-4e80-a80d-c671e8cd2a50" xsi:nil="true"/>
-  </documentManagement>
-</p:properties>
 </file>
 
 <file path=customXml/item3.xml><?xml version="1.0" encoding="utf-8"?>
@@ -11819,14 +14084,6 @@
 </file>
 
 <file path=customXml/itemProps1.xml><?xml version="1.0" encoding="utf-8"?>
-<ds:datastoreItem xmlns:ds="http://schemas.openxmlformats.org/officeDocument/2006/customXml" ds:itemID="{D9A29AA5-5937-490C-A495-D5C320512737}">
-  <ds:schemaRefs>
-    <ds:schemaRef ds:uri="http://schemas.microsoft.com/sharepoint/v3/contenttype/forms"/>
-  </ds:schemaRefs>
-</ds:datastoreItem>
-</file>
-
-<file path=customXml/itemProps2.xml><?xml version="1.0" encoding="utf-8"?>
 <ds:datastoreItem xmlns:ds="http://schemas.openxmlformats.org/officeDocument/2006/customXml" ds:itemID="{EAC5C5E7-64B2-47F3-84A2-5A4A99E0956D}">
   <ds:schemaRefs>
     <ds:schemaRef ds:uri="http://schemas.microsoft.com/office/2006/metadata/properties"/>
@@ -11838,6 +14095,14 @@
     <ds:schemaRef ds:uri="http://purl.org/dc/dcmitype/"/>
     <ds:schemaRef ds:uri="0e1bb11d-1fe8-4e80-a80d-c671e8cd2a50"/>
     <ds:schemaRef ds:uri="http://schemas.openxmlformats.org/package/2006/metadata/core-properties"/>
+  </ds:schemaRefs>
+</ds:datastoreItem>
+</file>
+
+<file path=customXml/itemProps2.xml><?xml version="1.0" encoding="utf-8"?>
+<ds:datastoreItem xmlns:ds="http://schemas.openxmlformats.org/officeDocument/2006/customXml" ds:itemID="{D9A29AA5-5937-490C-A495-D5C320512737}">
+  <ds:schemaRefs>
+    <ds:schemaRef ds:uri="http://schemas.microsoft.com/sharepoint/v3/contenttype/forms"/>
   </ds:schemaRefs>
 </ds:datastoreItem>
 </file>

</xml_diff>